<commit_message>
finish the ppt of 4/15
</commit_message>
<xml_diff>
--- a/Impala直方图模块设计.pptx
+++ b/Impala直方图模块设计.pptx
@@ -2,7 +2,7 @@
 <file path=ppt/presentation.xml><?xml version="1.0" encoding="utf-8"?>
 <p:presentation xmlns:a="http://schemas.openxmlformats.org/drawingml/2006/main" xmlns:r="http://schemas.openxmlformats.org/officeDocument/2006/relationships" xmlns:p="http://schemas.openxmlformats.org/presentationml/2006/main" saveSubsetFonts="1">
   <p:sldMasterIdLst>
-    <p:sldMasterId id="2147483648" r:id="rId1"/>
+    <p:sldMasterId id="2147483660" r:id="rId1"/>
   </p:sldMasterIdLst>
   <p:sldIdLst>
     <p:sldId id="256" r:id="rId2"/>
@@ -12,6 +12,9 @@
     <p:sldId id="262" r:id="rId6"/>
     <p:sldId id="263" r:id="rId7"/>
     <p:sldId id="264" r:id="rId8"/>
+    <p:sldId id="265" r:id="rId9"/>
+    <p:sldId id="266" r:id="rId10"/>
+    <p:sldId id="267" r:id="rId11"/>
   </p:sldIdLst>
   <p:sldSz cx="9144000" cy="6858000" type="screen4x3"/>
   <p:notesSz cx="6858000" cy="9144000"/>
@@ -114,7 +117,7 @@
 </file>
 
 <file path=ppt/slideLayouts/slideLayout1.xml><?xml version="1.0" encoding="utf-8"?>
-<p:sldLayout xmlns:a="http://schemas.openxmlformats.org/drawingml/2006/main" xmlns:r="http://schemas.openxmlformats.org/officeDocument/2006/relationships" xmlns:p="http://schemas.openxmlformats.org/presentationml/2006/main" type="title" preserve="1">
+<p:sldLayout xmlns:a="http://schemas.openxmlformats.org/drawingml/2006/main" xmlns:r="http://schemas.openxmlformats.org/officeDocument/2006/relationships" xmlns:p="http://schemas.openxmlformats.org/presentationml/2006/main" showMasterSp="0" preserve="1">
   <p:cSld name="标题幻灯片">
     <p:spTree>
       <p:nvGrpSpPr>
@@ -130,156 +133,38 @@
           <a:chExt cx="0" cy="0"/>
         </a:xfrm>
       </p:grpSpPr>
-      <p:sp>
-        <p:nvSpPr>
-          <p:cNvPr id="2" name="标题 1"/>
-          <p:cNvSpPr>
-            <a:spLocks noGrp="1"/>
-          </p:cNvSpPr>
-          <p:nvPr>
-            <p:ph type="ctrTitle"/>
-          </p:nvPr>
-        </p:nvSpPr>
+      <p:pic>
+        <p:nvPicPr>
+          <p:cNvPr id="8" name="图片 7"/>
+          <p:cNvPicPr>
+            <a:picLocks noChangeAspect="1"/>
+          </p:cNvPicPr>
+          <p:nvPr/>
+        </p:nvPicPr>
+        <p:blipFill rotWithShape="1">
+          <a:blip r:embed="rId2">
+            <a:extLst>
+              <a:ext uri="{28A0092B-C50C-407E-A947-70E740481C1C}">
+                <a14:useLocalDpi xmlns:a14="http://schemas.microsoft.com/office/drawing/2010/main" val="0"/>
+              </a:ext>
+            </a:extLst>
+          </a:blip>
+          <a:srcRect l="11265" t="365" r="2852" b="887"/>
+          <a:stretch/>
+        </p:blipFill>
         <p:spPr>
           <a:xfrm>
-            <a:off x="685800" y="2130425"/>
-            <a:ext cx="7772400" cy="1470025"/>
+            <a:off x="0" y="0"/>
+            <a:ext cx="9135836" cy="6858000"/>
           </a:xfrm>
+          <a:prstGeom prst="rect">
+            <a:avLst/>
+          </a:prstGeom>
         </p:spPr>
-        <p:txBody>
-          <a:bodyPr/>
-          <a:lstStyle/>
-          <a:p>
-            <a:r>
-              <a:rPr lang="zh-CN" altLang="en-US" smtClean="0"/>
-              <a:t>单击此处编辑母版标题样式</a:t>
-            </a:r>
-            <a:endParaRPr lang="zh-CN" altLang="en-US"/>
-          </a:p>
-        </p:txBody>
-      </p:sp>
-      <p:sp>
-        <p:nvSpPr>
-          <p:cNvPr id="3" name="副标题 2"/>
-          <p:cNvSpPr>
-            <a:spLocks noGrp="1"/>
-          </p:cNvSpPr>
-          <p:nvPr>
-            <p:ph type="subTitle" idx="1"/>
-          </p:nvPr>
-        </p:nvSpPr>
-        <p:spPr>
-          <a:xfrm>
-            <a:off x="1371600" y="3886200"/>
-            <a:ext cx="6400800" cy="1752600"/>
-          </a:xfrm>
-        </p:spPr>
-        <p:txBody>
-          <a:bodyPr/>
-          <a:lstStyle>
-            <a:lvl1pPr marL="0" indent="0" algn="ctr">
-              <a:buNone/>
-              <a:defRPr>
-                <a:solidFill>
-                  <a:schemeClr val="tx1">
-                    <a:tint val="75000"/>
-                  </a:schemeClr>
-                </a:solidFill>
-              </a:defRPr>
-            </a:lvl1pPr>
-            <a:lvl2pPr marL="457200" indent="0" algn="ctr">
-              <a:buNone/>
-              <a:defRPr>
-                <a:solidFill>
-                  <a:schemeClr val="tx1">
-                    <a:tint val="75000"/>
-                  </a:schemeClr>
-                </a:solidFill>
-              </a:defRPr>
-            </a:lvl2pPr>
-            <a:lvl3pPr marL="914400" indent="0" algn="ctr">
-              <a:buNone/>
-              <a:defRPr>
-                <a:solidFill>
-                  <a:schemeClr val="tx1">
-                    <a:tint val="75000"/>
-                  </a:schemeClr>
-                </a:solidFill>
-              </a:defRPr>
-            </a:lvl3pPr>
-            <a:lvl4pPr marL="1371600" indent="0" algn="ctr">
-              <a:buNone/>
-              <a:defRPr>
-                <a:solidFill>
-                  <a:schemeClr val="tx1">
-                    <a:tint val="75000"/>
-                  </a:schemeClr>
-                </a:solidFill>
-              </a:defRPr>
-            </a:lvl4pPr>
-            <a:lvl5pPr marL="1828800" indent="0" algn="ctr">
-              <a:buNone/>
-              <a:defRPr>
-                <a:solidFill>
-                  <a:schemeClr val="tx1">
-                    <a:tint val="75000"/>
-                  </a:schemeClr>
-                </a:solidFill>
-              </a:defRPr>
-            </a:lvl5pPr>
-            <a:lvl6pPr marL="2286000" indent="0" algn="ctr">
-              <a:buNone/>
-              <a:defRPr>
-                <a:solidFill>
-                  <a:schemeClr val="tx1">
-                    <a:tint val="75000"/>
-                  </a:schemeClr>
-                </a:solidFill>
-              </a:defRPr>
-            </a:lvl6pPr>
-            <a:lvl7pPr marL="2743200" indent="0" algn="ctr">
-              <a:buNone/>
-              <a:defRPr>
-                <a:solidFill>
-                  <a:schemeClr val="tx1">
-                    <a:tint val="75000"/>
-                  </a:schemeClr>
-                </a:solidFill>
-              </a:defRPr>
-            </a:lvl7pPr>
-            <a:lvl8pPr marL="3200400" indent="0" algn="ctr">
-              <a:buNone/>
-              <a:defRPr>
-                <a:solidFill>
-                  <a:schemeClr val="tx1">
-                    <a:tint val="75000"/>
-                  </a:schemeClr>
-                </a:solidFill>
-              </a:defRPr>
-            </a:lvl8pPr>
-            <a:lvl9pPr marL="3657600" indent="0" algn="ctr">
-              <a:buNone/>
-              <a:defRPr>
-                <a:solidFill>
-                  <a:schemeClr val="tx1">
-                    <a:tint val="75000"/>
-                  </a:schemeClr>
-                </a:solidFill>
-              </a:defRPr>
-            </a:lvl9pPr>
-          </a:lstStyle>
-          <a:p>
-            <a:r>
-              <a:rPr lang="zh-CN" altLang="en-US" smtClean="0"/>
-              <a:t>单击此处编辑母版副标题样式</a:t>
-            </a:r>
-            <a:endParaRPr lang="zh-CN" altLang="en-US"/>
-          </a:p>
-        </p:txBody>
-      </p:sp>
-      <p:sp>
-        <p:nvSpPr>
-          <p:cNvPr id="4" name="日期占位符 3"/>
+      </p:pic>
+      <p:sp>
+        <p:nvSpPr>
+          <p:cNvPr id="4" name="KSO_FD"/>
           <p:cNvSpPr>
             <a:spLocks noGrp="1"/>
           </p:cNvSpPr>
@@ -294,7 +179,7 @@
           <a:p>
             <a:fld id="{BA2C47C2-00A2-4FE4-90C9-AE59239C4E6C}" type="datetimeFigureOut">
               <a:rPr lang="zh-CN" altLang="en-US" smtClean="0"/>
-              <a:t>2015/4/9</a:t>
+              <a:t>2015/4/15</a:t>
             </a:fld>
             <a:endParaRPr lang="zh-CN" altLang="en-US"/>
           </a:p>
@@ -302,7 +187,7 @@
       </p:sp>
       <p:sp>
         <p:nvSpPr>
-          <p:cNvPr id="5" name="页脚占位符 4"/>
+          <p:cNvPr id="5" name="KSO_FT"/>
           <p:cNvSpPr>
             <a:spLocks noGrp="1"/>
           </p:cNvSpPr>
@@ -321,7 +206,7 @@
       </p:sp>
       <p:sp>
         <p:nvSpPr>
-          <p:cNvPr id="6" name="灯片编号占位符 5"/>
+          <p:cNvPr id="6" name="KSO_FN"/>
           <p:cNvSpPr>
             <a:spLocks noGrp="1"/>
           </p:cNvSpPr>
@@ -342,16 +227,483 @@
           </a:p>
         </p:txBody>
       </p:sp>
+      <p:sp>
+        <p:nvSpPr>
+          <p:cNvPr id="3" name="KSO_CT2"/>
+          <p:cNvSpPr>
+            <a:spLocks noGrp="1"/>
+          </p:cNvSpPr>
+          <p:nvPr>
+            <p:ph type="subTitle" idx="1" hasCustomPrompt="1"/>
+          </p:nvPr>
+        </p:nvSpPr>
+        <p:spPr>
+          <a:xfrm>
+            <a:off x="1913743" y="3439074"/>
+            <a:ext cx="5022600" cy="467211"/>
+          </a:xfrm>
+          <a:noFill/>
+        </p:spPr>
+        <p:txBody>
+          <a:bodyPr>
+            <a:noAutofit/>
+          </a:bodyPr>
+          <a:lstStyle>
+            <a:lvl1pPr marL="0" indent="0" algn="ctr">
+              <a:buNone/>
+              <a:defRPr sz="1600">
+                <a:solidFill>
+                  <a:srgbClr val="FFFFFF"/>
+                </a:solidFill>
+                <a:effectLst/>
+                <a:latin typeface="+mn-ea"/>
+                <a:ea typeface="+mn-ea"/>
+              </a:defRPr>
+            </a:lvl1pPr>
+            <a:lvl2pPr marL="342900" indent="0" algn="ctr">
+              <a:buNone/>
+              <a:defRPr sz="1500"/>
+            </a:lvl2pPr>
+            <a:lvl3pPr marL="685800" indent="0" algn="ctr">
+              <a:buNone/>
+              <a:defRPr sz="1350"/>
+            </a:lvl3pPr>
+            <a:lvl4pPr marL="1028700" indent="0" algn="ctr">
+              <a:buNone/>
+              <a:defRPr sz="1200"/>
+            </a:lvl4pPr>
+            <a:lvl5pPr marL="1371600" indent="0" algn="ctr">
+              <a:buNone/>
+              <a:defRPr sz="1200"/>
+            </a:lvl5pPr>
+            <a:lvl6pPr marL="1714500" indent="0" algn="ctr">
+              <a:buNone/>
+              <a:defRPr sz="1200"/>
+            </a:lvl6pPr>
+            <a:lvl7pPr marL="2057400" indent="0" algn="ctr">
+              <a:buNone/>
+              <a:defRPr sz="1200"/>
+            </a:lvl7pPr>
+            <a:lvl8pPr marL="2400300" indent="0" algn="ctr">
+              <a:buNone/>
+              <a:defRPr sz="1200"/>
+            </a:lvl8pPr>
+            <a:lvl9pPr marL="2743200" indent="0" algn="ctr">
+              <a:buNone/>
+              <a:defRPr sz="1200"/>
+            </a:lvl9pPr>
+          </a:lstStyle>
+          <a:p>
+            <a:r>
+              <a:rPr lang="zh-CN" altLang="en-US" dirty="0" smtClean="0"/>
+              <a:t>单击此处添加您的副标题</a:t>
+            </a:r>
+          </a:p>
+        </p:txBody>
+      </p:sp>
+      <p:sp>
+        <p:nvSpPr>
+          <p:cNvPr id="7" name="KSO_CT1"/>
+          <p:cNvSpPr>
+            <a:spLocks noGrp="1"/>
+          </p:cNvSpPr>
+          <p:nvPr>
+            <p:ph type="title" hasCustomPrompt="1"/>
+          </p:nvPr>
+        </p:nvSpPr>
+        <p:spPr>
+          <a:xfrm>
+            <a:off x="1913743" y="1847851"/>
+            <a:ext cx="5022600" cy="1166213"/>
+          </a:xfrm>
+        </p:spPr>
+        <p:txBody>
+          <a:bodyPr>
+            <a:noAutofit/>
+          </a:bodyPr>
+          <a:lstStyle>
+            <a:lvl1pPr algn="ctr">
+              <a:lnSpc>
+                <a:spcPct val="100000"/>
+              </a:lnSpc>
+              <a:defRPr sz="2800" b="0" kern="1000" baseline="0">
+                <a:solidFill>
+                  <a:srgbClr val="FFFFFF"/>
+                </a:solidFill>
+                <a:effectLst/>
+                <a:latin typeface="+mj-ea"/>
+                <a:ea typeface="+mj-ea"/>
+              </a:defRPr>
+            </a:lvl1pPr>
+          </a:lstStyle>
+          <a:p>
+            <a:r>
+              <a:rPr lang="zh-CN" altLang="en-US" dirty="0" smtClean="0"/>
+              <a:t>单击此处添加您的标题文字</a:t>
+            </a:r>
+            <a:endParaRPr lang="zh-CN" altLang="en-US" dirty="0"/>
+          </a:p>
+        </p:txBody>
+      </p:sp>
+      <p:cxnSp>
+        <p:nvCxnSpPr>
+          <p:cNvPr id="10" name="直接连接符 9"/>
+          <p:cNvCxnSpPr/>
+          <p:nvPr/>
+        </p:nvCxnSpPr>
+        <p:spPr>
+          <a:xfrm>
+            <a:off x="2085625" y="3195038"/>
+            <a:ext cx="4693962" cy="0"/>
+          </a:xfrm>
+          <a:prstGeom prst="line">
+            <a:avLst/>
+          </a:prstGeom>
+          <a:ln>
+            <a:solidFill>
+              <a:srgbClr val="FFFFFF">
+                <a:alpha val="60000"/>
+              </a:srgbClr>
+            </a:solidFill>
+          </a:ln>
+        </p:spPr>
+        <p:style>
+          <a:lnRef idx="1">
+            <a:schemeClr val="accent1"/>
+          </a:lnRef>
+          <a:fillRef idx="0">
+            <a:schemeClr val="accent1"/>
+          </a:fillRef>
+          <a:effectRef idx="0">
+            <a:schemeClr val="accent1"/>
+          </a:effectRef>
+          <a:fontRef idx="minor">
+            <a:schemeClr val="tx1"/>
+          </a:fontRef>
+        </p:style>
+      </p:cxnSp>
+      <p:cxnSp>
+        <p:nvCxnSpPr>
+          <p:cNvPr id="12" name="直接连接符 11"/>
+          <p:cNvCxnSpPr/>
+          <p:nvPr/>
+        </p:nvCxnSpPr>
+        <p:spPr>
+          <a:xfrm>
+            <a:off x="2085625" y="3240757"/>
+            <a:ext cx="4693962" cy="0"/>
+          </a:xfrm>
+          <a:prstGeom prst="line">
+            <a:avLst/>
+          </a:prstGeom>
+          <a:ln>
+            <a:solidFill>
+              <a:srgbClr val="FFFFFF">
+                <a:alpha val="60000"/>
+              </a:srgbClr>
+            </a:solidFill>
+          </a:ln>
+        </p:spPr>
+        <p:style>
+          <a:lnRef idx="1">
+            <a:schemeClr val="accent1"/>
+          </a:lnRef>
+          <a:fillRef idx="0">
+            <a:schemeClr val="accent1"/>
+          </a:fillRef>
+          <a:effectRef idx="0">
+            <a:schemeClr val="accent1"/>
+          </a:effectRef>
+          <a:fontRef idx="minor">
+            <a:schemeClr val="tx1"/>
+          </a:fontRef>
+        </p:style>
+      </p:cxnSp>
+      <p:sp>
+        <p:nvSpPr>
+          <p:cNvPr id="13" name="圆角矩形 12">
+            <a:hlinkClick r:id="" action="ppaction://hlinkshowjump?jump=nextslide"/>
+          </p:cNvPr>
+          <p:cNvSpPr/>
+          <p:nvPr/>
+        </p:nvSpPr>
+        <p:spPr>
+          <a:xfrm>
+            <a:off x="3600450" y="5000625"/>
+            <a:ext cx="1549771" cy="485776"/>
+          </a:xfrm>
+          <a:prstGeom prst="roundRect">
+            <a:avLst>
+              <a:gd name="adj" fmla="val 50000"/>
+            </a:avLst>
+          </a:prstGeom>
+          <a:solidFill>
+            <a:srgbClr val="FFFFFF"/>
+          </a:solidFill>
+          <a:ln>
+            <a:noFill/>
+          </a:ln>
+        </p:spPr>
+        <p:style>
+          <a:lnRef idx="2">
+            <a:schemeClr val="accent1">
+              <a:shade val="50000"/>
+            </a:schemeClr>
+          </a:lnRef>
+          <a:fillRef idx="1">
+            <a:schemeClr val="accent1"/>
+          </a:fillRef>
+          <a:effectRef idx="0">
+            <a:schemeClr val="accent1"/>
+          </a:effectRef>
+          <a:fontRef idx="minor">
+            <a:schemeClr val="lt1"/>
+          </a:fontRef>
+        </p:style>
+        <p:txBody>
+          <a:bodyPr rtlCol="0" anchor="ctr"/>
+          <a:lstStyle/>
+          <a:p>
+            <a:pPr algn="ctr"/>
+            <a:endParaRPr lang="zh-CN" altLang="en-US" sz="1350"/>
+          </a:p>
+        </p:txBody>
+      </p:sp>
+      <p:grpSp>
+        <p:nvGrpSpPr>
+          <p:cNvPr id="18" name="组合 17"/>
+          <p:cNvGrpSpPr/>
+          <p:nvPr/>
+        </p:nvGrpSpPr>
+        <p:grpSpPr>
+          <a:xfrm>
+            <a:off x="4200526" y="5960897"/>
+            <a:ext cx="335756" cy="274441"/>
+            <a:chOff x="5810250" y="5610226"/>
+            <a:chExt cx="723900" cy="627822"/>
+          </a:xfrm>
+        </p:grpSpPr>
+        <p:sp>
+          <p:nvSpPr>
+            <p:cNvPr id="14" name="等腰三角形 13"/>
+            <p:cNvSpPr/>
+            <p:nvPr userDrawn="1"/>
+          </p:nvSpPr>
+          <p:spPr>
+            <a:xfrm flipV="1">
+              <a:off x="5810250" y="5610226"/>
+              <a:ext cx="723900" cy="424898"/>
+            </a:xfrm>
+            <a:prstGeom prst="triangle">
+              <a:avLst/>
+            </a:prstGeom>
+            <a:noFill/>
+            <a:ln>
+              <a:solidFill>
+                <a:srgbClr val="FFFFFF"/>
+              </a:solidFill>
+            </a:ln>
+          </p:spPr>
+          <p:style>
+            <a:lnRef idx="2">
+              <a:schemeClr val="accent1">
+                <a:shade val="50000"/>
+              </a:schemeClr>
+            </a:lnRef>
+            <a:fillRef idx="1">
+              <a:schemeClr val="accent1"/>
+            </a:fillRef>
+            <a:effectRef idx="0">
+              <a:schemeClr val="accent1"/>
+            </a:effectRef>
+            <a:fontRef idx="minor">
+              <a:schemeClr val="lt1"/>
+            </a:fontRef>
+          </p:style>
+          <p:txBody>
+            <a:bodyPr rtlCol="0" anchor="ctr"/>
+            <a:lstStyle/>
+            <a:p>
+              <a:pPr algn="ctr"/>
+              <a:endParaRPr lang="zh-CN" altLang="en-US" sz="1350"/>
+            </a:p>
+          </p:txBody>
+        </p:sp>
+        <p:sp>
+          <p:nvSpPr>
+            <p:cNvPr id="15" name="等腰三角形 14"/>
+            <p:cNvSpPr/>
+            <p:nvPr userDrawn="1"/>
+          </p:nvSpPr>
+          <p:spPr>
+            <a:xfrm flipV="1">
+              <a:off x="5810250" y="5813150"/>
+              <a:ext cx="723900" cy="424898"/>
+            </a:xfrm>
+            <a:prstGeom prst="triangle">
+              <a:avLst/>
+            </a:prstGeom>
+            <a:noFill/>
+            <a:ln>
+              <a:solidFill>
+                <a:srgbClr val="FFFFFF"/>
+              </a:solidFill>
+            </a:ln>
+          </p:spPr>
+          <p:style>
+            <a:lnRef idx="2">
+              <a:schemeClr val="accent1">
+                <a:shade val="50000"/>
+              </a:schemeClr>
+            </a:lnRef>
+            <a:fillRef idx="1">
+              <a:schemeClr val="accent1"/>
+            </a:fillRef>
+            <a:effectRef idx="0">
+              <a:schemeClr val="accent1"/>
+            </a:effectRef>
+            <a:fontRef idx="minor">
+              <a:schemeClr val="lt1"/>
+            </a:fontRef>
+          </p:style>
+          <p:txBody>
+            <a:bodyPr rtlCol="0" anchor="ctr"/>
+            <a:lstStyle/>
+            <a:p>
+              <a:pPr algn="ctr"/>
+              <a:endParaRPr lang="zh-CN" altLang="en-US" sz="1350"/>
+            </a:p>
+          </p:txBody>
+        </p:sp>
+      </p:grpSp>
+      <p:cxnSp>
+        <p:nvCxnSpPr>
+          <p:cNvPr id="16" name="直接连接符 15"/>
+          <p:cNvCxnSpPr>
+            <a:stCxn id="13" idx="2"/>
+          </p:cNvCxnSpPr>
+          <p:nvPr/>
+        </p:nvCxnSpPr>
+        <p:spPr>
+          <a:xfrm>
+            <a:off x="4375336" y="5486402"/>
+            <a:ext cx="0" cy="1371599"/>
+          </a:xfrm>
+          <a:prstGeom prst="line">
+            <a:avLst/>
+          </a:prstGeom>
+          <a:ln>
+            <a:solidFill>
+              <a:srgbClr val="FFFFFF">
+                <a:alpha val="60000"/>
+              </a:srgbClr>
+            </a:solidFill>
+          </a:ln>
+        </p:spPr>
+        <p:style>
+          <a:lnRef idx="1">
+            <a:schemeClr val="accent1"/>
+          </a:lnRef>
+          <a:fillRef idx="0">
+            <a:schemeClr val="accent1"/>
+          </a:fillRef>
+          <a:effectRef idx="0">
+            <a:schemeClr val="accent1"/>
+          </a:effectRef>
+          <a:fontRef idx="minor">
+            <a:schemeClr val="tx1"/>
+          </a:fontRef>
+        </p:style>
+      </p:cxnSp>
+      <p:sp>
+        <p:nvSpPr>
+          <p:cNvPr id="17" name="文本框 16"/>
+          <p:cNvSpPr txBox="1"/>
+          <p:nvPr/>
+        </p:nvSpPr>
+        <p:spPr>
+          <a:xfrm>
+            <a:off x="3935059" y="5014747"/>
+            <a:ext cx="919995" cy="414985"/>
+          </a:xfrm>
+          <a:prstGeom prst="rect">
+            <a:avLst/>
+          </a:prstGeom>
+          <a:noFill/>
+        </p:spPr>
+        <p:txBody>
+          <a:bodyPr wrap="none" rtlCol="0">
+            <a:spAutoFit/>
+          </a:bodyPr>
+          <a:lstStyle/>
+          <a:p>
+            <a:pPr>
+              <a:lnSpc>
+                <a:spcPct val="130000"/>
+              </a:lnSpc>
+            </a:pPr>
+            <a:r>
+              <a:rPr lang="en-US" altLang="zh-CN" sz="1800" dirty="0" smtClean="0">
+                <a:solidFill>
+                  <a:schemeClr val="accent1">
+                    <a:lumMod val="75000"/>
+                  </a:schemeClr>
+                </a:solidFill>
+                <a:latin typeface="Arial" panose="020B0604020202020204" pitchFamily="34" charset="0"/>
+                <a:ea typeface="微软雅黑" panose="020B0503020204020204" pitchFamily="34" charset="-122"/>
+              </a:rPr>
+              <a:t>START</a:t>
+            </a:r>
+            <a:endParaRPr lang="zh-CN" altLang="en-US" sz="1800" dirty="0" smtClean="0">
+              <a:solidFill>
+                <a:schemeClr val="accent1">
+                  <a:lumMod val="75000"/>
+                </a:schemeClr>
+              </a:solidFill>
+              <a:latin typeface="Arial" panose="020B0604020202020204" pitchFamily="34" charset="0"/>
+              <a:ea typeface="微软雅黑" panose="020B0503020204020204" pitchFamily="34" charset="-122"/>
+            </a:endParaRPr>
+          </a:p>
+        </p:txBody>
+      </p:sp>
     </p:spTree>
     <p:extLst>
       <p:ext uri="{BB962C8B-B14F-4D97-AF65-F5344CB8AC3E}">
-        <p14:creationId xmlns:p14="http://schemas.microsoft.com/office/powerpoint/2010/main" val="2516019204"/>
+        <p14:creationId xmlns:p14="http://schemas.microsoft.com/office/powerpoint/2010/main" val="1349920608"/>
       </p:ext>
     </p:extLst>
   </p:cSld>
   <p:clrMapOvr>
     <a:masterClrMapping/>
   </p:clrMapOvr>
+  <p:timing>
+    <p:tnLst>
+      <p:par>
+        <p:cTn id="1" dur="indefinite" restart="never" nodeType="tmRoot"/>
+      </p:par>
+    </p:tnLst>
+  </p:timing>
+  <p:extLst mod="1">
+    <p:ext uri="{DCECCB84-F9BA-43D5-87BE-67443E8EF086}">
+      <p15:sldGuideLst xmlns:p15="http://schemas.microsoft.com/office/powerpoint/2012/main" xmlns="">
+        <p15:guide id="1" pos="4967">
+          <p15:clr>
+            <a:srgbClr val="FBAE40"/>
+          </p15:clr>
+        </p15:guide>
+        <p15:guide id="2" orient="horz" pos="2160">
+          <p15:clr>
+            <a:srgbClr val="FBAE40"/>
+          </p15:clr>
+        </p15:guide>
+        <p15:guide id="3" pos="6623">
+          <p15:clr>
+            <a:srgbClr val="FBAE40"/>
+          </p15:clr>
+        </p15:guide>
+      </p15:sldGuideLst>
+    </p:ext>
+  </p:extLst>
 </p:sldLayout>
 </file>
 
@@ -374,7 +726,7 @@
       </p:grpSpPr>
       <p:sp>
         <p:nvSpPr>
-          <p:cNvPr id="2" name="标题 1"/>
+          <p:cNvPr id="2" name="KSO_BT1"/>
           <p:cNvSpPr>
             <a:spLocks noGrp="1"/>
           </p:cNvSpPr>
@@ -391,13 +743,13 @@
               <a:rPr lang="zh-CN" altLang="en-US" smtClean="0"/>
               <a:t>单击此处编辑母版标题样式</a:t>
             </a:r>
-            <a:endParaRPr lang="zh-CN" altLang="en-US"/>
-          </a:p>
-        </p:txBody>
-      </p:sp>
-      <p:sp>
-        <p:nvSpPr>
-          <p:cNvPr id="3" name="竖排文字占位符 2"/>
+            <a:endParaRPr lang="en-US" dirty="0"/>
+          </a:p>
+        </p:txBody>
+      </p:sp>
+      <p:sp>
+        <p:nvSpPr>
+          <p:cNvPr id="3" name="KSO_BC1"/>
           <p:cNvSpPr>
             <a:spLocks noGrp="1"/>
           </p:cNvSpPr>
@@ -423,33 +775,11 @@
               <a:t>第二级</a:t>
             </a:r>
           </a:p>
-          <a:p>
-            <a:pPr lvl="2"/>
-            <a:r>
-              <a:rPr lang="zh-CN" altLang="en-US" smtClean="0"/>
-              <a:t>第三级</a:t>
-            </a:r>
-          </a:p>
-          <a:p>
-            <a:pPr lvl="3"/>
-            <a:r>
-              <a:rPr lang="zh-CN" altLang="en-US" smtClean="0"/>
-              <a:t>第四级</a:t>
-            </a:r>
-          </a:p>
-          <a:p>
-            <a:pPr lvl="4"/>
-            <a:r>
-              <a:rPr lang="zh-CN" altLang="en-US" smtClean="0"/>
-              <a:t>第五级</a:t>
-            </a:r>
-            <a:endParaRPr lang="zh-CN" altLang="en-US"/>
-          </a:p>
-        </p:txBody>
-      </p:sp>
-      <p:sp>
-        <p:nvSpPr>
-          <p:cNvPr id="4" name="日期占位符 3"/>
+        </p:txBody>
+      </p:sp>
+      <p:sp>
+        <p:nvSpPr>
+          <p:cNvPr id="4" name="KSO_FD"/>
           <p:cNvSpPr>
             <a:spLocks noGrp="1"/>
           </p:cNvSpPr>
@@ -464,7 +794,7 @@
           <a:p>
             <a:fld id="{BA2C47C2-00A2-4FE4-90C9-AE59239C4E6C}" type="datetimeFigureOut">
               <a:rPr lang="zh-CN" altLang="en-US" smtClean="0"/>
-              <a:t>2015/4/9</a:t>
+              <a:t>2015/4/15</a:t>
             </a:fld>
             <a:endParaRPr lang="zh-CN" altLang="en-US"/>
           </a:p>
@@ -472,7 +802,7 @@
       </p:sp>
       <p:sp>
         <p:nvSpPr>
-          <p:cNvPr id="5" name="页脚占位符 4"/>
+          <p:cNvPr id="5" name="KSO_FT"/>
           <p:cNvSpPr>
             <a:spLocks noGrp="1"/>
           </p:cNvSpPr>
@@ -491,7 +821,7 @@
       </p:sp>
       <p:sp>
         <p:nvSpPr>
-          <p:cNvPr id="6" name="灯片编号占位符 5"/>
+          <p:cNvPr id="6" name="KSO_FN"/>
           <p:cNvSpPr>
             <a:spLocks noGrp="1"/>
           </p:cNvSpPr>
@@ -515,7 +845,7 @@
     </p:spTree>
     <p:extLst>
       <p:ext uri="{BB962C8B-B14F-4D97-AF65-F5344CB8AC3E}">
-        <p14:creationId xmlns:p14="http://schemas.microsoft.com/office/powerpoint/2010/main" val="4270890233"/>
+        <p14:creationId xmlns:p14="http://schemas.microsoft.com/office/powerpoint/2010/main" val="903356099"/>
       </p:ext>
     </p:extLst>
   </p:cSld>
@@ -527,7 +857,7 @@
 
 <file path=ppt/slideLayouts/slideLayout11.xml><?xml version="1.0" encoding="utf-8"?>
 <p:sldLayout xmlns:a="http://schemas.openxmlformats.org/drawingml/2006/main" xmlns:r="http://schemas.openxmlformats.org/officeDocument/2006/relationships" xmlns:p="http://schemas.openxmlformats.org/presentationml/2006/main" type="vertTitleAndTx" preserve="1">
-  <p:cSld name="垂直排列标题与文本">
+  <p:cSld name="垂直排列标题与&#10;文本">
     <p:spTree>
       <p:nvGrpSpPr>
         <p:cNvPr id="1" name=""/>
@@ -544,7 +874,7 @@
       </p:grpSpPr>
       <p:sp>
         <p:nvSpPr>
-          <p:cNvPr id="2" name="竖排标题 1"/>
+          <p:cNvPr id="2" name="KSO_BT1"/>
           <p:cNvSpPr>
             <a:spLocks noGrp="1"/>
           </p:cNvSpPr>
@@ -554,8 +884,8 @@
         </p:nvSpPr>
         <p:spPr>
           <a:xfrm>
-            <a:off x="6629400" y="274638"/>
-            <a:ext cx="2057400" cy="5851525"/>
+            <a:off x="7628468" y="365125"/>
+            <a:ext cx="886883" cy="5811838"/>
           </a:xfrm>
         </p:spPr>
         <p:txBody>
@@ -566,13 +896,13 @@
               <a:rPr lang="zh-CN" altLang="en-US" smtClean="0"/>
               <a:t>单击此处编辑母版标题样式</a:t>
             </a:r>
-            <a:endParaRPr lang="zh-CN" altLang="en-US"/>
-          </a:p>
-        </p:txBody>
-      </p:sp>
-      <p:sp>
-        <p:nvSpPr>
-          <p:cNvPr id="3" name="竖排文字占位符 2"/>
+            <a:endParaRPr lang="en-US" dirty="0"/>
+          </a:p>
+        </p:txBody>
+      </p:sp>
+      <p:sp>
+        <p:nvSpPr>
+          <p:cNvPr id="3" name="KSO_BC1"/>
           <p:cNvSpPr>
             <a:spLocks noGrp="1"/>
           </p:cNvSpPr>
@@ -582,8 +912,8 @@
         </p:nvSpPr>
         <p:spPr>
           <a:xfrm>
-            <a:off x="457200" y="274638"/>
-            <a:ext cx="6019800" cy="5851525"/>
+            <a:off x="1585382" y="365125"/>
+            <a:ext cx="5949952" cy="5811838"/>
           </a:xfrm>
         </p:spPr>
         <p:txBody>
@@ -603,33 +933,11 @@
               <a:t>第二级</a:t>
             </a:r>
           </a:p>
-          <a:p>
-            <a:pPr lvl="2"/>
-            <a:r>
-              <a:rPr lang="zh-CN" altLang="en-US" smtClean="0"/>
-              <a:t>第三级</a:t>
-            </a:r>
-          </a:p>
-          <a:p>
-            <a:pPr lvl="3"/>
-            <a:r>
-              <a:rPr lang="zh-CN" altLang="en-US" smtClean="0"/>
-              <a:t>第四级</a:t>
-            </a:r>
-          </a:p>
-          <a:p>
-            <a:pPr lvl="4"/>
-            <a:r>
-              <a:rPr lang="zh-CN" altLang="en-US" smtClean="0"/>
-              <a:t>第五级</a:t>
-            </a:r>
-            <a:endParaRPr lang="zh-CN" altLang="en-US"/>
-          </a:p>
-        </p:txBody>
-      </p:sp>
-      <p:sp>
-        <p:nvSpPr>
-          <p:cNvPr id="4" name="日期占位符 3"/>
+        </p:txBody>
+      </p:sp>
+      <p:sp>
+        <p:nvSpPr>
+          <p:cNvPr id="4" name="KSO_FD"/>
           <p:cNvSpPr>
             <a:spLocks noGrp="1"/>
           </p:cNvSpPr>
@@ -644,7 +952,7 @@
           <a:p>
             <a:fld id="{BA2C47C2-00A2-4FE4-90C9-AE59239C4E6C}" type="datetimeFigureOut">
               <a:rPr lang="zh-CN" altLang="en-US" smtClean="0"/>
-              <a:t>2015/4/9</a:t>
+              <a:t>2015/4/15</a:t>
             </a:fld>
             <a:endParaRPr lang="zh-CN" altLang="en-US"/>
           </a:p>
@@ -652,7 +960,7 @@
       </p:sp>
       <p:sp>
         <p:nvSpPr>
-          <p:cNvPr id="5" name="页脚占位符 4"/>
+          <p:cNvPr id="5" name="KSO_FT"/>
           <p:cNvSpPr>
             <a:spLocks noGrp="1"/>
           </p:cNvSpPr>
@@ -671,7 +979,7 @@
       </p:sp>
       <p:sp>
         <p:nvSpPr>
-          <p:cNvPr id="6" name="灯片编号占位符 5"/>
+          <p:cNvPr id="6" name="KSO_FN"/>
           <p:cNvSpPr>
             <a:spLocks noGrp="1"/>
           </p:cNvSpPr>
@@ -695,7 +1003,7 @@
     </p:spTree>
     <p:extLst>
       <p:ext uri="{BB962C8B-B14F-4D97-AF65-F5344CB8AC3E}">
-        <p14:creationId xmlns:p14="http://schemas.microsoft.com/office/powerpoint/2010/main" val="599021959"/>
+        <p14:creationId xmlns:p14="http://schemas.microsoft.com/office/powerpoint/2010/main" val="3137074791"/>
       </p:ext>
     </p:extLst>
   </p:cSld>
@@ -724,7 +1032,7 @@
       </p:grpSpPr>
       <p:sp>
         <p:nvSpPr>
-          <p:cNvPr id="2" name="标题 1"/>
+          <p:cNvPr id="2" name="KSO_BT1"/>
           <p:cNvSpPr>
             <a:spLocks noGrp="1"/>
           </p:cNvSpPr>
@@ -734,20 +1042,26 @@
         </p:nvSpPr>
         <p:spPr/>
         <p:txBody>
-          <a:bodyPr/>
-          <a:lstStyle/>
+          <a:bodyPr>
+            <a:normAutofit/>
+          </a:bodyPr>
+          <a:lstStyle>
+            <a:lvl1pPr>
+              <a:defRPr sz="3200"/>
+            </a:lvl1pPr>
+          </a:lstStyle>
           <a:p>
             <a:r>
               <a:rPr lang="zh-CN" altLang="en-US" smtClean="0"/>
               <a:t>单击此处编辑母版标题样式</a:t>
             </a:r>
-            <a:endParaRPr lang="zh-CN" altLang="en-US"/>
-          </a:p>
-        </p:txBody>
-      </p:sp>
-      <p:sp>
-        <p:nvSpPr>
-          <p:cNvPr id="3" name="内容占位符 2"/>
+            <a:endParaRPr lang="en-US" dirty="0"/>
+          </a:p>
+        </p:txBody>
+      </p:sp>
+      <p:sp>
+        <p:nvSpPr>
+          <p:cNvPr id="3" name="KSO_BC1"/>
           <p:cNvSpPr>
             <a:spLocks noGrp="1"/>
           </p:cNvSpPr>
@@ -757,8 +1071,21 @@
         </p:nvSpPr>
         <p:spPr/>
         <p:txBody>
-          <a:bodyPr/>
-          <a:lstStyle/>
+          <a:bodyPr>
+            <a:normAutofit/>
+          </a:bodyPr>
+          <a:lstStyle>
+            <a:lvl1pPr>
+              <a:defRPr sz="2400">
+                <a:solidFill>
+                  <a:schemeClr val="accent1"/>
+                </a:solidFill>
+              </a:defRPr>
+            </a:lvl1pPr>
+            <a:lvl2pPr>
+              <a:defRPr sz="1600"/>
+            </a:lvl2pPr>
+          </a:lstStyle>
           <a:p>
             <a:pPr lvl="0"/>
             <a:r>
@@ -773,33 +1100,11 @@
               <a:t>第二级</a:t>
             </a:r>
           </a:p>
-          <a:p>
-            <a:pPr lvl="2"/>
-            <a:r>
-              <a:rPr lang="zh-CN" altLang="en-US" smtClean="0"/>
-              <a:t>第三级</a:t>
-            </a:r>
-          </a:p>
-          <a:p>
-            <a:pPr lvl="3"/>
-            <a:r>
-              <a:rPr lang="zh-CN" altLang="en-US" smtClean="0"/>
-              <a:t>第四级</a:t>
-            </a:r>
-          </a:p>
-          <a:p>
-            <a:pPr lvl="4"/>
-            <a:r>
-              <a:rPr lang="zh-CN" altLang="en-US" smtClean="0"/>
-              <a:t>第五级</a:t>
-            </a:r>
-            <a:endParaRPr lang="zh-CN" altLang="en-US"/>
-          </a:p>
-        </p:txBody>
-      </p:sp>
-      <p:sp>
-        <p:nvSpPr>
-          <p:cNvPr id="4" name="日期占位符 3"/>
+        </p:txBody>
+      </p:sp>
+      <p:sp>
+        <p:nvSpPr>
+          <p:cNvPr id="4" name="KSO_FD"/>
           <p:cNvSpPr>
             <a:spLocks noGrp="1"/>
           </p:cNvSpPr>
@@ -814,7 +1119,7 @@
           <a:p>
             <a:fld id="{BA2C47C2-00A2-4FE4-90C9-AE59239C4E6C}" type="datetimeFigureOut">
               <a:rPr lang="zh-CN" altLang="en-US" smtClean="0"/>
-              <a:t>2015/4/9</a:t>
+              <a:t>2015/4/15</a:t>
             </a:fld>
             <a:endParaRPr lang="zh-CN" altLang="en-US"/>
           </a:p>
@@ -822,7 +1127,7 @@
       </p:sp>
       <p:sp>
         <p:nvSpPr>
-          <p:cNvPr id="5" name="页脚占位符 4"/>
+          <p:cNvPr id="5" name="KSO_FT"/>
           <p:cNvSpPr>
             <a:spLocks noGrp="1"/>
           </p:cNvSpPr>
@@ -841,7 +1146,7 @@
       </p:sp>
       <p:sp>
         <p:nvSpPr>
-          <p:cNvPr id="6" name="灯片编号占位符 5"/>
+          <p:cNvPr id="6" name="KSO_FN"/>
           <p:cNvSpPr>
             <a:spLocks noGrp="1"/>
           </p:cNvSpPr>
@@ -865,7 +1170,7 @@
     </p:spTree>
     <p:extLst>
       <p:ext uri="{BB962C8B-B14F-4D97-AF65-F5344CB8AC3E}">
-        <p14:creationId xmlns:p14="http://schemas.microsoft.com/office/powerpoint/2010/main" val="3690274018"/>
+        <p14:creationId xmlns:p14="http://schemas.microsoft.com/office/powerpoint/2010/main" val="3460886491"/>
       </p:ext>
     </p:extLst>
   </p:cSld>
@@ -894,68 +1199,86 @@
       </p:grpSpPr>
       <p:sp>
         <p:nvSpPr>
-          <p:cNvPr id="2" name="标题 1"/>
-          <p:cNvSpPr>
-            <a:spLocks noGrp="1"/>
-          </p:cNvSpPr>
-          <p:nvPr>
-            <p:ph type="title"/>
+          <p:cNvPr id="2" name="KSO_ST1"/>
+          <p:cNvSpPr>
+            <a:spLocks noGrp="1"/>
+          </p:cNvSpPr>
+          <p:nvPr>
+            <p:ph type="title" hasCustomPrompt="1"/>
           </p:nvPr>
         </p:nvSpPr>
         <p:spPr>
           <a:xfrm>
-            <a:off x="722313" y="4406900"/>
-            <a:ext cx="7772400" cy="1362075"/>
+            <a:off x="1574007" y="2108201"/>
+            <a:ext cx="5995988" cy="1235075"/>
           </a:xfrm>
         </p:spPr>
         <p:txBody>
-          <a:bodyPr anchor="t"/>
+          <a:bodyPr anchor="b">
+            <a:normAutofit/>
+          </a:bodyPr>
           <a:lstStyle>
-            <a:lvl1pPr algn="l">
-              <a:defRPr sz="4000" b="1" cap="all"/>
+            <a:lvl1pPr algn="ctr">
+              <a:defRPr sz="2700">
+                <a:solidFill>
+                  <a:schemeClr val="tx2"/>
+                </a:solidFill>
+                <a:effectLst/>
+              </a:defRPr>
             </a:lvl1pPr>
           </a:lstStyle>
           <a:p>
             <a:r>
-              <a:rPr lang="zh-CN" altLang="en-US" smtClean="0"/>
-              <a:t>单击此处编辑母版标题样式</a:t>
-            </a:r>
-            <a:endParaRPr lang="zh-CN" altLang="en-US"/>
-          </a:p>
-        </p:txBody>
-      </p:sp>
-      <p:sp>
-        <p:nvSpPr>
-          <p:cNvPr id="3" name="文本占位符 2"/>
-          <p:cNvSpPr>
-            <a:spLocks noGrp="1"/>
-          </p:cNvSpPr>
-          <p:nvPr>
-            <p:ph type="body" idx="1"/>
+              <a:rPr lang="zh-CN" altLang="en-US" dirty="0" smtClean="0"/>
+              <a:t>此处添加您的标题</a:t>
+            </a:r>
+            <a:endParaRPr lang="en-US" dirty="0"/>
+          </a:p>
+        </p:txBody>
+      </p:sp>
+      <p:sp>
+        <p:nvSpPr>
+          <p:cNvPr id="3" name="KSO_ST2"/>
+          <p:cNvSpPr>
+            <a:spLocks noGrp="1"/>
+          </p:cNvSpPr>
+          <p:nvPr>
+            <p:ph type="body" idx="1" hasCustomPrompt="1"/>
           </p:nvPr>
         </p:nvSpPr>
         <p:spPr>
           <a:xfrm>
-            <a:off x="722313" y="2906713"/>
-            <a:ext cx="7772400" cy="1500187"/>
+            <a:off x="3038170" y="3400425"/>
+            <a:ext cx="3067663" cy="357478"/>
           </a:xfrm>
+          <a:prstGeom prst="roundRect">
+            <a:avLst>
+              <a:gd name="adj" fmla="val 50000"/>
+            </a:avLst>
+          </a:prstGeom>
+          <a:solidFill>
+            <a:schemeClr val="tx2">
+              <a:lumMod val="40000"/>
+              <a:lumOff val="60000"/>
+            </a:schemeClr>
+          </a:solidFill>
         </p:spPr>
         <p:txBody>
-          <a:bodyPr anchor="b"/>
+          <a:bodyPr anchor="ctr">
+            <a:normAutofit/>
+          </a:bodyPr>
           <a:lstStyle>
-            <a:lvl1pPr marL="0" indent="0">
-              <a:buNone/>
-              <a:defRPr sz="2000">
+            <a:lvl1pPr marL="0" indent="0" algn="ctr">
+              <a:buNone/>
+              <a:defRPr sz="1200">
                 <a:solidFill>
-                  <a:schemeClr val="tx1">
-                    <a:tint val="75000"/>
-                  </a:schemeClr>
+                  <a:schemeClr val="bg1"/>
                 </a:solidFill>
               </a:defRPr>
             </a:lvl1pPr>
-            <a:lvl2pPr marL="457200" indent="0">
-              <a:buNone/>
-              <a:defRPr sz="1800">
+            <a:lvl2pPr marL="342900" indent="0">
+              <a:buNone/>
+              <a:defRPr sz="1500">
                 <a:solidFill>
                   <a:schemeClr val="tx1">
                     <a:tint val="75000"/>
@@ -963,9 +1286,9 @@
                 </a:solidFill>
               </a:defRPr>
             </a:lvl2pPr>
-            <a:lvl3pPr marL="914400" indent="0">
-              <a:buNone/>
-              <a:defRPr sz="1600">
+            <a:lvl3pPr marL="685800" indent="0">
+              <a:buNone/>
+              <a:defRPr sz="1350">
                 <a:solidFill>
                   <a:schemeClr val="tx1">
                     <a:tint val="75000"/>
@@ -973,9 +1296,9 @@
                 </a:solidFill>
               </a:defRPr>
             </a:lvl3pPr>
-            <a:lvl4pPr marL="1371600" indent="0">
-              <a:buNone/>
-              <a:defRPr sz="1400">
+            <a:lvl4pPr marL="1028700" indent="0">
+              <a:buNone/>
+              <a:defRPr sz="1200">
                 <a:solidFill>
                   <a:schemeClr val="tx1">
                     <a:tint val="75000"/>
@@ -983,9 +1306,9 @@
                 </a:solidFill>
               </a:defRPr>
             </a:lvl4pPr>
-            <a:lvl5pPr marL="1828800" indent="0">
-              <a:buNone/>
-              <a:defRPr sz="1400">
+            <a:lvl5pPr marL="1371600" indent="0">
+              <a:buNone/>
+              <a:defRPr sz="1200">
                 <a:solidFill>
                   <a:schemeClr val="tx1">
                     <a:tint val="75000"/>
@@ -993,9 +1316,9 @@
                 </a:solidFill>
               </a:defRPr>
             </a:lvl5pPr>
-            <a:lvl6pPr marL="2286000" indent="0">
-              <a:buNone/>
-              <a:defRPr sz="1400">
+            <a:lvl6pPr marL="1714500" indent="0">
+              <a:buNone/>
+              <a:defRPr sz="1200">
                 <a:solidFill>
                   <a:schemeClr val="tx1">
                     <a:tint val="75000"/>
@@ -1003,9 +1326,9 @@
                 </a:solidFill>
               </a:defRPr>
             </a:lvl6pPr>
-            <a:lvl7pPr marL="2743200" indent="0">
-              <a:buNone/>
-              <a:defRPr sz="1400">
+            <a:lvl7pPr marL="2057400" indent="0">
+              <a:buNone/>
+              <a:defRPr sz="1200">
                 <a:solidFill>
                   <a:schemeClr val="tx1">
                     <a:tint val="75000"/>
@@ -1013,9 +1336,9 @@
                 </a:solidFill>
               </a:defRPr>
             </a:lvl7pPr>
-            <a:lvl8pPr marL="3200400" indent="0">
-              <a:buNone/>
-              <a:defRPr sz="1400">
+            <a:lvl8pPr marL="2400300" indent="0">
+              <a:buNone/>
+              <a:defRPr sz="1200">
                 <a:solidFill>
                   <a:schemeClr val="tx1">
                     <a:tint val="75000"/>
@@ -1023,9 +1346,9 @@
                 </a:solidFill>
               </a:defRPr>
             </a:lvl8pPr>
-            <a:lvl9pPr marL="3657600" indent="0">
-              <a:buNone/>
-              <a:defRPr sz="1400">
+            <a:lvl9pPr marL="2743200" indent="0">
+              <a:buNone/>
+              <a:defRPr sz="1200">
                 <a:solidFill>
                   <a:schemeClr val="tx1">
                     <a:tint val="75000"/>
@@ -1035,17 +1358,17 @@
             </a:lvl9pPr>
           </a:lstStyle>
           <a:p>
-            <a:pPr lvl="0"/>
-            <a:r>
-              <a:rPr lang="zh-CN" altLang="en-US" smtClean="0"/>
-              <a:t>单击此处编辑母版文本样式</a:t>
-            </a:r>
-          </a:p>
-        </p:txBody>
-      </p:sp>
-      <p:sp>
-        <p:nvSpPr>
-          <p:cNvPr id="4" name="日期占位符 3"/>
+            <a:r>
+              <a:rPr lang="zh-CN" altLang="en-US" dirty="0" smtClean="0"/>
+              <a:t>单击此处添加您的副标题</a:t>
+            </a:r>
+            <a:endParaRPr lang="en-US" altLang="zh-CN" dirty="0"/>
+          </a:p>
+        </p:txBody>
+      </p:sp>
+      <p:sp>
+        <p:nvSpPr>
+          <p:cNvPr id="4" name="KSO_FD"/>
           <p:cNvSpPr>
             <a:spLocks noGrp="1"/>
           </p:cNvSpPr>
@@ -1060,7 +1383,7 @@
           <a:p>
             <a:fld id="{BA2C47C2-00A2-4FE4-90C9-AE59239C4E6C}" type="datetimeFigureOut">
               <a:rPr lang="zh-CN" altLang="en-US" smtClean="0"/>
-              <a:t>2015/4/9</a:t>
+              <a:t>2015/4/15</a:t>
             </a:fld>
             <a:endParaRPr lang="zh-CN" altLang="en-US"/>
           </a:p>
@@ -1068,7 +1391,7 @@
       </p:sp>
       <p:sp>
         <p:nvSpPr>
-          <p:cNvPr id="5" name="页脚占位符 4"/>
+          <p:cNvPr id="5" name="KSO_FT"/>
           <p:cNvSpPr>
             <a:spLocks noGrp="1"/>
           </p:cNvSpPr>
@@ -1087,7 +1410,7 @@
       </p:sp>
       <p:sp>
         <p:nvSpPr>
-          <p:cNvPr id="6" name="灯片编号占位符 5"/>
+          <p:cNvPr id="6" name="KSO_FN"/>
           <p:cNvSpPr>
             <a:spLocks noGrp="1"/>
           </p:cNvSpPr>
@@ -1111,13 +1434,18 @@
     </p:spTree>
     <p:extLst>
       <p:ext uri="{BB962C8B-B14F-4D97-AF65-F5344CB8AC3E}">
-        <p14:creationId xmlns:p14="http://schemas.microsoft.com/office/powerpoint/2010/main" val="3450905331"/>
+        <p14:creationId xmlns:p14="http://schemas.microsoft.com/office/powerpoint/2010/main" val="907962555"/>
       </p:ext>
     </p:extLst>
   </p:cSld>
   <p:clrMapOvr>
     <a:masterClrMapping/>
   </p:clrMapOvr>
+  <p:extLst mod="1">
+    <p:ext uri="{DCECCB84-F9BA-43D5-87BE-67443E8EF086}">
+      <p15:sldGuideLst xmlns:p15="http://schemas.microsoft.com/office/powerpoint/2012/main" xmlns=""/>
+    </p:ext>
+  </p:extLst>
 </p:sldLayout>
 </file>
 
@@ -1140,7 +1468,7 @@
       </p:grpSpPr>
       <p:sp>
         <p:nvSpPr>
-          <p:cNvPr id="2" name="标题 1"/>
+          <p:cNvPr id="2" name="KSO_BT1"/>
           <p:cNvSpPr>
             <a:spLocks noGrp="1"/>
           </p:cNvSpPr>
@@ -1157,13 +1485,13 @@
               <a:rPr lang="zh-CN" altLang="en-US" smtClean="0"/>
               <a:t>单击此处编辑母版标题样式</a:t>
             </a:r>
-            <a:endParaRPr lang="zh-CN" altLang="en-US"/>
-          </a:p>
-        </p:txBody>
-      </p:sp>
-      <p:sp>
-        <p:nvSpPr>
-          <p:cNvPr id="3" name="内容占位符 2"/>
+            <a:endParaRPr lang="en-US" dirty="0"/>
+          </a:p>
+        </p:txBody>
+      </p:sp>
+      <p:sp>
+        <p:nvSpPr>
+          <p:cNvPr id="3" name="KSO_BC1"/>
           <p:cNvSpPr>
             <a:spLocks noGrp="1"/>
           </p:cNvSpPr>
@@ -1173,41 +1501,13 @@
         </p:nvSpPr>
         <p:spPr>
           <a:xfrm>
-            <a:off x="457200" y="1600200"/>
-            <a:ext cx="4038600" cy="4525963"/>
+            <a:off x="1049867" y="1244602"/>
+            <a:ext cx="3810000" cy="4932363"/>
           </a:xfrm>
         </p:spPr>
         <p:txBody>
           <a:bodyPr/>
-          <a:lstStyle>
-            <a:lvl1pPr>
-              <a:defRPr sz="2800"/>
-            </a:lvl1pPr>
-            <a:lvl2pPr>
-              <a:defRPr sz="2400"/>
-            </a:lvl2pPr>
-            <a:lvl3pPr>
-              <a:defRPr sz="2000"/>
-            </a:lvl3pPr>
-            <a:lvl4pPr>
-              <a:defRPr sz="1800"/>
-            </a:lvl4pPr>
-            <a:lvl5pPr>
-              <a:defRPr sz="1800"/>
-            </a:lvl5pPr>
-            <a:lvl6pPr>
-              <a:defRPr sz="1800"/>
-            </a:lvl6pPr>
-            <a:lvl7pPr>
-              <a:defRPr sz="1800"/>
-            </a:lvl7pPr>
-            <a:lvl8pPr>
-              <a:defRPr sz="1800"/>
-            </a:lvl8pPr>
-            <a:lvl9pPr>
-              <a:defRPr sz="1800"/>
-            </a:lvl9pPr>
-          </a:lstStyle>
+          <a:lstStyle/>
           <a:p>
             <a:pPr lvl="0"/>
             <a:r>
@@ -1222,33 +1522,11 @@
               <a:t>第二级</a:t>
             </a:r>
           </a:p>
-          <a:p>
-            <a:pPr lvl="2"/>
-            <a:r>
-              <a:rPr lang="zh-CN" altLang="en-US" smtClean="0"/>
-              <a:t>第三级</a:t>
-            </a:r>
-          </a:p>
-          <a:p>
-            <a:pPr lvl="3"/>
-            <a:r>
-              <a:rPr lang="zh-CN" altLang="en-US" smtClean="0"/>
-              <a:t>第四级</a:t>
-            </a:r>
-          </a:p>
-          <a:p>
-            <a:pPr lvl="4"/>
-            <a:r>
-              <a:rPr lang="zh-CN" altLang="en-US" smtClean="0"/>
-              <a:t>第五级</a:t>
-            </a:r>
-            <a:endParaRPr lang="zh-CN" altLang="en-US"/>
-          </a:p>
-        </p:txBody>
-      </p:sp>
-      <p:sp>
-        <p:nvSpPr>
-          <p:cNvPr id="4" name="内容占位符 3"/>
+        </p:txBody>
+      </p:sp>
+      <p:sp>
+        <p:nvSpPr>
+          <p:cNvPr id="4" name="KSO_BC2"/>
           <p:cNvSpPr>
             <a:spLocks noGrp="1"/>
           </p:cNvSpPr>
@@ -1258,41 +1536,13 @@
         </p:nvSpPr>
         <p:spPr>
           <a:xfrm>
-            <a:off x="4648200" y="1600200"/>
-            <a:ext cx="4038600" cy="4525963"/>
+            <a:off x="4889500" y="1244602"/>
+            <a:ext cx="3820587" cy="4932363"/>
           </a:xfrm>
         </p:spPr>
         <p:txBody>
           <a:bodyPr/>
-          <a:lstStyle>
-            <a:lvl1pPr>
-              <a:defRPr sz="2800"/>
-            </a:lvl1pPr>
-            <a:lvl2pPr>
-              <a:defRPr sz="2400"/>
-            </a:lvl2pPr>
-            <a:lvl3pPr>
-              <a:defRPr sz="2000"/>
-            </a:lvl3pPr>
-            <a:lvl4pPr>
-              <a:defRPr sz="1800"/>
-            </a:lvl4pPr>
-            <a:lvl5pPr>
-              <a:defRPr sz="1800"/>
-            </a:lvl5pPr>
-            <a:lvl6pPr>
-              <a:defRPr sz="1800"/>
-            </a:lvl6pPr>
-            <a:lvl7pPr>
-              <a:defRPr sz="1800"/>
-            </a:lvl7pPr>
-            <a:lvl8pPr>
-              <a:defRPr sz="1800"/>
-            </a:lvl8pPr>
-            <a:lvl9pPr>
-              <a:defRPr sz="1800"/>
-            </a:lvl9pPr>
-          </a:lstStyle>
+          <a:lstStyle/>
           <a:p>
             <a:pPr lvl="0"/>
             <a:r>
@@ -1307,33 +1557,11 @@
               <a:t>第二级</a:t>
             </a:r>
           </a:p>
-          <a:p>
-            <a:pPr lvl="2"/>
-            <a:r>
-              <a:rPr lang="zh-CN" altLang="en-US" smtClean="0"/>
-              <a:t>第三级</a:t>
-            </a:r>
-          </a:p>
-          <a:p>
-            <a:pPr lvl="3"/>
-            <a:r>
-              <a:rPr lang="zh-CN" altLang="en-US" smtClean="0"/>
-              <a:t>第四级</a:t>
-            </a:r>
-          </a:p>
-          <a:p>
-            <a:pPr lvl="4"/>
-            <a:r>
-              <a:rPr lang="zh-CN" altLang="en-US" smtClean="0"/>
-              <a:t>第五级</a:t>
-            </a:r>
-            <a:endParaRPr lang="zh-CN" altLang="en-US"/>
-          </a:p>
-        </p:txBody>
-      </p:sp>
-      <p:sp>
-        <p:nvSpPr>
-          <p:cNvPr id="5" name="日期占位符 4"/>
+        </p:txBody>
+      </p:sp>
+      <p:sp>
+        <p:nvSpPr>
+          <p:cNvPr id="5" name="KSO_FD"/>
           <p:cNvSpPr>
             <a:spLocks noGrp="1"/>
           </p:cNvSpPr>
@@ -1348,7 +1576,7 @@
           <a:p>
             <a:fld id="{BA2C47C2-00A2-4FE4-90C9-AE59239C4E6C}" type="datetimeFigureOut">
               <a:rPr lang="zh-CN" altLang="en-US" smtClean="0"/>
-              <a:t>2015/4/9</a:t>
+              <a:t>2015/4/15</a:t>
             </a:fld>
             <a:endParaRPr lang="zh-CN" altLang="en-US"/>
           </a:p>
@@ -1356,7 +1584,7 @@
       </p:sp>
       <p:sp>
         <p:nvSpPr>
-          <p:cNvPr id="6" name="页脚占位符 5"/>
+          <p:cNvPr id="6" name="KSO_FT"/>
           <p:cNvSpPr>
             <a:spLocks noGrp="1"/>
           </p:cNvSpPr>
@@ -1375,7 +1603,7 @@
       </p:sp>
       <p:sp>
         <p:nvSpPr>
-          <p:cNvPr id="7" name="灯片编号占位符 6"/>
+          <p:cNvPr id="7" name="KSO_FN"/>
           <p:cNvSpPr>
             <a:spLocks noGrp="1"/>
           </p:cNvSpPr>
@@ -1399,7 +1627,7 @@
     </p:spTree>
     <p:extLst>
       <p:ext uri="{BB962C8B-B14F-4D97-AF65-F5344CB8AC3E}">
-        <p14:creationId xmlns:p14="http://schemas.microsoft.com/office/powerpoint/2010/main" val="2665850103"/>
+        <p14:creationId xmlns:p14="http://schemas.microsoft.com/office/powerpoint/2010/main" val="328122817"/>
       </p:ext>
     </p:extLst>
   </p:cSld>
@@ -1428,85 +1656,88 @@
       </p:grpSpPr>
       <p:sp>
         <p:nvSpPr>
-          <p:cNvPr id="2" name="标题 1"/>
+          <p:cNvPr id="2" name="KSO_BT1"/>
           <p:cNvSpPr>
             <a:spLocks noGrp="1"/>
           </p:cNvSpPr>
           <p:nvPr>
             <p:ph type="title"/>
-          </p:nvPr>
-        </p:nvSpPr>
-        <p:spPr/>
-        <p:txBody>
-          <a:bodyPr/>
-          <a:lstStyle>
-            <a:lvl1pPr>
-              <a:defRPr/>
-            </a:lvl1pPr>
-          </a:lstStyle>
-          <a:p>
-            <a:r>
-              <a:rPr lang="zh-CN" altLang="en-US" smtClean="0"/>
-              <a:t>单击此处编辑母版标题样式</a:t>
-            </a:r>
-            <a:endParaRPr lang="zh-CN" altLang="en-US"/>
-          </a:p>
-        </p:txBody>
-      </p:sp>
-      <p:sp>
-        <p:nvSpPr>
-          <p:cNvPr id="3" name="文本占位符 2"/>
-          <p:cNvSpPr>
-            <a:spLocks noGrp="1"/>
-          </p:cNvSpPr>
-          <p:nvPr>
-            <p:ph type="body" idx="1"/>
           </p:nvPr>
         </p:nvSpPr>
         <p:spPr>
           <a:xfrm>
-            <a:off x="457200" y="1535113"/>
-            <a:ext cx="4040188" cy="639762"/>
+            <a:off x="1727199" y="118532"/>
+            <a:ext cx="6984076" cy="717022"/>
           </a:xfrm>
         </p:spPr>
         <p:txBody>
-          <a:bodyPr anchor="b"/>
+          <a:bodyPr/>
+          <a:lstStyle/>
+          <a:p>
+            <a:r>
+              <a:rPr lang="zh-CN" altLang="en-US" smtClean="0"/>
+              <a:t>单击此处编辑母版标题样式</a:t>
+            </a:r>
+            <a:endParaRPr lang="en-US" dirty="0"/>
+          </a:p>
+        </p:txBody>
+      </p:sp>
+      <p:sp>
+        <p:nvSpPr>
+          <p:cNvPr id="3" name="Text Placeholder 2"/>
+          <p:cNvSpPr>
+            <a:spLocks noGrp="1"/>
+          </p:cNvSpPr>
+          <p:nvPr>
+            <p:ph type="body" idx="1"/>
+          </p:nvPr>
+        </p:nvSpPr>
+        <p:spPr>
+          <a:xfrm>
+            <a:off x="824577" y="1376362"/>
+            <a:ext cx="3868340" cy="823912"/>
+          </a:xfrm>
+        </p:spPr>
+        <p:txBody>
+          <a:bodyPr anchor="b">
+            <a:normAutofit/>
+          </a:bodyPr>
           <a:lstStyle>
             <a:lvl1pPr marL="0" indent="0">
               <a:buNone/>
-              <a:defRPr sz="2400" b="1"/>
+              <a:defRPr sz="1350" b="1"/>
             </a:lvl1pPr>
-            <a:lvl2pPr marL="457200" indent="0">
-              <a:buNone/>
-              <a:defRPr sz="2000" b="1"/>
+            <a:lvl2pPr marL="342900" indent="0">
+              <a:buNone/>
+              <a:defRPr sz="1500" b="1"/>
             </a:lvl2pPr>
-            <a:lvl3pPr marL="914400" indent="0">
-              <a:buNone/>
-              <a:defRPr sz="1800" b="1"/>
+            <a:lvl3pPr marL="685800" indent="0">
+              <a:buNone/>
+              <a:defRPr sz="1350" b="1"/>
             </a:lvl3pPr>
-            <a:lvl4pPr marL="1371600" indent="0">
-              <a:buNone/>
-              <a:defRPr sz="1600" b="1"/>
+            <a:lvl4pPr marL="1028700" indent="0">
+              <a:buNone/>
+              <a:defRPr sz="1200" b="1"/>
             </a:lvl4pPr>
-            <a:lvl5pPr marL="1828800" indent="0">
-              <a:buNone/>
-              <a:defRPr sz="1600" b="1"/>
+            <a:lvl5pPr marL="1371600" indent="0">
+              <a:buNone/>
+              <a:defRPr sz="1200" b="1"/>
             </a:lvl5pPr>
-            <a:lvl6pPr marL="2286000" indent="0">
-              <a:buNone/>
-              <a:defRPr sz="1600" b="1"/>
+            <a:lvl6pPr marL="1714500" indent="0">
+              <a:buNone/>
+              <a:defRPr sz="1200" b="1"/>
             </a:lvl6pPr>
-            <a:lvl7pPr marL="2743200" indent="0">
-              <a:buNone/>
-              <a:defRPr sz="1600" b="1"/>
+            <a:lvl7pPr marL="2057400" indent="0">
+              <a:buNone/>
+              <a:defRPr sz="1200" b="1"/>
             </a:lvl7pPr>
-            <a:lvl8pPr marL="3200400" indent="0">
-              <a:buNone/>
-              <a:defRPr sz="1600" b="1"/>
+            <a:lvl8pPr marL="2400300" indent="0">
+              <a:buNone/>
+              <a:defRPr sz="1200" b="1"/>
             </a:lvl8pPr>
-            <a:lvl9pPr marL="3657600" indent="0">
-              <a:buNone/>
-              <a:defRPr sz="1600" b="1"/>
+            <a:lvl9pPr marL="2743200" indent="0">
+              <a:buNone/>
+              <a:defRPr sz="1200" b="1"/>
             </a:lvl9pPr>
           </a:lstStyle>
           <a:p>
@@ -1520,7 +1751,7 @@
       </p:sp>
       <p:sp>
         <p:nvSpPr>
-          <p:cNvPr id="4" name="内容占位符 3"/>
+          <p:cNvPr id="4" name="KSO_BC1"/>
           <p:cNvSpPr>
             <a:spLocks noGrp="1"/>
           </p:cNvSpPr>
@@ -1530,39 +1761,85 @@
         </p:nvSpPr>
         <p:spPr>
           <a:xfrm>
-            <a:off x="457200" y="2174875"/>
-            <a:ext cx="4040188" cy="3951288"/>
+            <a:off x="824577" y="2200274"/>
+            <a:ext cx="3868340" cy="3684588"/>
           </a:xfrm>
         </p:spPr>
         <p:txBody>
           <a:bodyPr/>
+          <a:lstStyle/>
+          <a:p>
+            <a:pPr lvl="0"/>
+            <a:r>
+              <a:rPr lang="zh-CN" altLang="en-US" smtClean="0"/>
+              <a:t>单击此处编辑母版文本样式</a:t>
+            </a:r>
+          </a:p>
+          <a:p>
+            <a:pPr lvl="1"/>
+            <a:r>
+              <a:rPr lang="zh-CN" altLang="en-US" smtClean="0"/>
+              <a:t>第二级</a:t>
+            </a:r>
+          </a:p>
+        </p:txBody>
+      </p:sp>
+      <p:sp>
+        <p:nvSpPr>
+          <p:cNvPr id="5" name="Text Placeholder 4"/>
+          <p:cNvSpPr>
+            <a:spLocks noGrp="1"/>
+          </p:cNvSpPr>
+          <p:nvPr>
+            <p:ph type="body" sz="quarter" idx="3"/>
+          </p:nvPr>
+        </p:nvSpPr>
+        <p:spPr>
+          <a:xfrm>
+            <a:off x="4823885" y="1376362"/>
+            <a:ext cx="3887391" cy="823912"/>
+          </a:xfrm>
+        </p:spPr>
+        <p:txBody>
+          <a:bodyPr anchor="b">
+            <a:normAutofit/>
+          </a:bodyPr>
           <a:lstStyle>
-            <a:lvl1pPr>
-              <a:defRPr sz="2400"/>
+            <a:lvl1pPr marL="0" indent="0">
+              <a:buNone/>
+              <a:defRPr sz="1350" b="1"/>
             </a:lvl1pPr>
-            <a:lvl2pPr>
-              <a:defRPr sz="2000"/>
+            <a:lvl2pPr marL="342900" indent="0">
+              <a:buNone/>
+              <a:defRPr sz="1500" b="1"/>
             </a:lvl2pPr>
-            <a:lvl3pPr>
-              <a:defRPr sz="1800"/>
+            <a:lvl3pPr marL="685800" indent="0">
+              <a:buNone/>
+              <a:defRPr sz="1350" b="1"/>
             </a:lvl3pPr>
-            <a:lvl4pPr>
-              <a:defRPr sz="1600"/>
+            <a:lvl4pPr marL="1028700" indent="0">
+              <a:buNone/>
+              <a:defRPr sz="1200" b="1"/>
             </a:lvl4pPr>
-            <a:lvl5pPr>
-              <a:defRPr sz="1600"/>
+            <a:lvl5pPr marL="1371600" indent="0">
+              <a:buNone/>
+              <a:defRPr sz="1200" b="1"/>
             </a:lvl5pPr>
-            <a:lvl6pPr>
-              <a:defRPr sz="1600"/>
+            <a:lvl6pPr marL="1714500" indent="0">
+              <a:buNone/>
+              <a:defRPr sz="1200" b="1"/>
             </a:lvl6pPr>
-            <a:lvl7pPr>
-              <a:defRPr sz="1600"/>
+            <a:lvl7pPr marL="2057400" indent="0">
+              <a:buNone/>
+              <a:defRPr sz="1200" b="1"/>
             </a:lvl7pPr>
-            <a:lvl8pPr>
-              <a:defRPr sz="1600"/>
+            <a:lvl8pPr marL="2400300" indent="0">
+              <a:buNone/>
+              <a:defRPr sz="1200" b="1"/>
             </a:lvl8pPr>
-            <a:lvl9pPr>
-              <a:defRPr sz="1600"/>
+            <a:lvl9pPr marL="2743200" indent="0">
+              <a:buNone/>
+              <a:defRPr sz="1200" b="1"/>
             </a:lvl9pPr>
           </a:lstStyle>
           <a:p>
@@ -1572,93 +1849,27 @@
               <a:t>单击此处编辑母版文本样式</a:t>
             </a:r>
           </a:p>
-          <a:p>
-            <a:pPr lvl="1"/>
-            <a:r>
-              <a:rPr lang="zh-CN" altLang="en-US" smtClean="0"/>
-              <a:t>第二级</a:t>
-            </a:r>
-          </a:p>
-          <a:p>
-            <a:pPr lvl="2"/>
-            <a:r>
-              <a:rPr lang="zh-CN" altLang="en-US" smtClean="0"/>
-              <a:t>第三级</a:t>
-            </a:r>
-          </a:p>
-          <a:p>
-            <a:pPr lvl="3"/>
-            <a:r>
-              <a:rPr lang="zh-CN" altLang="en-US" smtClean="0"/>
-              <a:t>第四级</a:t>
-            </a:r>
-          </a:p>
-          <a:p>
-            <a:pPr lvl="4"/>
-            <a:r>
-              <a:rPr lang="zh-CN" altLang="en-US" smtClean="0"/>
-              <a:t>第五级</a:t>
-            </a:r>
-            <a:endParaRPr lang="zh-CN" altLang="en-US"/>
-          </a:p>
-        </p:txBody>
-      </p:sp>
-      <p:sp>
-        <p:nvSpPr>
-          <p:cNvPr id="5" name="文本占位符 4"/>
-          <p:cNvSpPr>
-            <a:spLocks noGrp="1"/>
-          </p:cNvSpPr>
-          <p:nvPr>
-            <p:ph type="body" sz="quarter" idx="3"/>
+        </p:txBody>
+      </p:sp>
+      <p:sp>
+        <p:nvSpPr>
+          <p:cNvPr id="6" name="KSO_BC2"/>
+          <p:cNvSpPr>
+            <a:spLocks noGrp="1"/>
+          </p:cNvSpPr>
+          <p:nvPr>
+            <p:ph sz="quarter" idx="4"/>
           </p:nvPr>
         </p:nvSpPr>
         <p:spPr>
           <a:xfrm>
-            <a:off x="4645025" y="1535113"/>
-            <a:ext cx="4041775" cy="639762"/>
+            <a:off x="4823885" y="2200274"/>
+            <a:ext cx="3887391" cy="3684588"/>
           </a:xfrm>
         </p:spPr>
         <p:txBody>
-          <a:bodyPr anchor="b"/>
-          <a:lstStyle>
-            <a:lvl1pPr marL="0" indent="0">
-              <a:buNone/>
-              <a:defRPr sz="2400" b="1"/>
-            </a:lvl1pPr>
-            <a:lvl2pPr marL="457200" indent="0">
-              <a:buNone/>
-              <a:defRPr sz="2000" b="1"/>
-            </a:lvl2pPr>
-            <a:lvl3pPr marL="914400" indent="0">
-              <a:buNone/>
-              <a:defRPr sz="1800" b="1"/>
-            </a:lvl3pPr>
-            <a:lvl4pPr marL="1371600" indent="0">
-              <a:buNone/>
-              <a:defRPr sz="1600" b="1"/>
-            </a:lvl4pPr>
-            <a:lvl5pPr marL="1828800" indent="0">
-              <a:buNone/>
-              <a:defRPr sz="1600" b="1"/>
-            </a:lvl5pPr>
-            <a:lvl6pPr marL="2286000" indent="0">
-              <a:buNone/>
-              <a:defRPr sz="1600" b="1"/>
-            </a:lvl6pPr>
-            <a:lvl7pPr marL="2743200" indent="0">
-              <a:buNone/>
-              <a:defRPr sz="1600" b="1"/>
-            </a:lvl7pPr>
-            <a:lvl8pPr marL="3200400" indent="0">
-              <a:buNone/>
-              <a:defRPr sz="1600" b="1"/>
-            </a:lvl8pPr>
-            <a:lvl9pPr marL="3657600" indent="0">
-              <a:buNone/>
-              <a:defRPr sz="1600" b="1"/>
-            </a:lvl9pPr>
-          </a:lstStyle>
+          <a:bodyPr/>
+          <a:lstStyle/>
           <a:p>
             <a:pPr lvl="0"/>
             <a:r>
@@ -1666,62 +1877,6 @@
               <a:t>单击此处编辑母版文本样式</a:t>
             </a:r>
           </a:p>
-        </p:txBody>
-      </p:sp>
-      <p:sp>
-        <p:nvSpPr>
-          <p:cNvPr id="6" name="内容占位符 5"/>
-          <p:cNvSpPr>
-            <a:spLocks noGrp="1"/>
-          </p:cNvSpPr>
-          <p:nvPr>
-            <p:ph sz="quarter" idx="4"/>
-          </p:nvPr>
-        </p:nvSpPr>
-        <p:spPr>
-          <a:xfrm>
-            <a:off x="4645025" y="2174875"/>
-            <a:ext cx="4041775" cy="3951288"/>
-          </a:xfrm>
-        </p:spPr>
-        <p:txBody>
-          <a:bodyPr/>
-          <a:lstStyle>
-            <a:lvl1pPr>
-              <a:defRPr sz="2400"/>
-            </a:lvl1pPr>
-            <a:lvl2pPr>
-              <a:defRPr sz="2000"/>
-            </a:lvl2pPr>
-            <a:lvl3pPr>
-              <a:defRPr sz="1800"/>
-            </a:lvl3pPr>
-            <a:lvl4pPr>
-              <a:defRPr sz="1600"/>
-            </a:lvl4pPr>
-            <a:lvl5pPr>
-              <a:defRPr sz="1600"/>
-            </a:lvl5pPr>
-            <a:lvl6pPr>
-              <a:defRPr sz="1600"/>
-            </a:lvl6pPr>
-            <a:lvl7pPr>
-              <a:defRPr sz="1600"/>
-            </a:lvl7pPr>
-            <a:lvl8pPr>
-              <a:defRPr sz="1600"/>
-            </a:lvl8pPr>
-            <a:lvl9pPr>
-              <a:defRPr sz="1600"/>
-            </a:lvl9pPr>
-          </a:lstStyle>
-          <a:p>
-            <a:pPr lvl="0"/>
-            <a:r>
-              <a:rPr lang="zh-CN" altLang="en-US" smtClean="0"/>
-              <a:t>单击此处编辑母版文本样式</a:t>
-            </a:r>
-          </a:p>
           <a:p>
             <a:pPr lvl="1"/>
             <a:r>
@@ -1729,33 +1884,11 @@
               <a:t>第二级</a:t>
             </a:r>
           </a:p>
-          <a:p>
-            <a:pPr lvl="2"/>
-            <a:r>
-              <a:rPr lang="zh-CN" altLang="en-US" smtClean="0"/>
-              <a:t>第三级</a:t>
-            </a:r>
-          </a:p>
-          <a:p>
-            <a:pPr lvl="3"/>
-            <a:r>
-              <a:rPr lang="zh-CN" altLang="en-US" smtClean="0"/>
-              <a:t>第四级</a:t>
-            </a:r>
-          </a:p>
-          <a:p>
-            <a:pPr lvl="4"/>
-            <a:r>
-              <a:rPr lang="zh-CN" altLang="en-US" smtClean="0"/>
-              <a:t>第五级</a:t>
-            </a:r>
-            <a:endParaRPr lang="zh-CN" altLang="en-US"/>
-          </a:p>
-        </p:txBody>
-      </p:sp>
-      <p:sp>
-        <p:nvSpPr>
-          <p:cNvPr id="7" name="日期占位符 6"/>
+        </p:txBody>
+      </p:sp>
+      <p:sp>
+        <p:nvSpPr>
+          <p:cNvPr id="7" name="KSO_FD"/>
           <p:cNvSpPr>
             <a:spLocks noGrp="1"/>
           </p:cNvSpPr>
@@ -1770,7 +1903,7 @@
           <a:p>
             <a:fld id="{BA2C47C2-00A2-4FE4-90C9-AE59239C4E6C}" type="datetimeFigureOut">
               <a:rPr lang="zh-CN" altLang="en-US" smtClean="0"/>
-              <a:t>2015/4/9</a:t>
+              <a:t>2015/4/15</a:t>
             </a:fld>
             <a:endParaRPr lang="zh-CN" altLang="en-US"/>
           </a:p>
@@ -1778,7 +1911,7 @@
       </p:sp>
       <p:sp>
         <p:nvSpPr>
-          <p:cNvPr id="8" name="页脚占位符 7"/>
+          <p:cNvPr id="8" name="KSO_FT"/>
           <p:cNvSpPr>
             <a:spLocks noGrp="1"/>
           </p:cNvSpPr>
@@ -1797,7 +1930,7 @@
       </p:sp>
       <p:sp>
         <p:nvSpPr>
-          <p:cNvPr id="9" name="灯片编号占位符 8"/>
+          <p:cNvPr id="9" name="KSO_FN"/>
           <p:cNvSpPr>
             <a:spLocks noGrp="1"/>
           </p:cNvSpPr>
@@ -1821,7 +1954,7 @@
     </p:spTree>
     <p:extLst>
       <p:ext uri="{BB962C8B-B14F-4D97-AF65-F5344CB8AC3E}">
-        <p14:creationId xmlns:p14="http://schemas.microsoft.com/office/powerpoint/2010/main" val="3208610636"/>
+        <p14:creationId xmlns:p14="http://schemas.microsoft.com/office/powerpoint/2010/main" val="2273180616"/>
       </p:ext>
     </p:extLst>
   </p:cSld>
@@ -1850,7 +1983,7 @@
       </p:grpSpPr>
       <p:sp>
         <p:nvSpPr>
-          <p:cNvPr id="2" name="标题 1"/>
+          <p:cNvPr id="2" name="KSO_BT1"/>
           <p:cNvSpPr>
             <a:spLocks noGrp="1"/>
           </p:cNvSpPr>
@@ -1867,13 +2000,13 @@
               <a:rPr lang="zh-CN" altLang="en-US" smtClean="0"/>
               <a:t>单击此处编辑母版标题样式</a:t>
             </a:r>
-            <a:endParaRPr lang="zh-CN" altLang="en-US"/>
-          </a:p>
-        </p:txBody>
-      </p:sp>
-      <p:sp>
-        <p:nvSpPr>
-          <p:cNvPr id="3" name="日期占位符 2"/>
+            <a:endParaRPr lang="en-US" dirty="0"/>
+          </a:p>
+        </p:txBody>
+      </p:sp>
+      <p:sp>
+        <p:nvSpPr>
+          <p:cNvPr id="3" name="KSO_FD"/>
           <p:cNvSpPr>
             <a:spLocks noGrp="1"/>
           </p:cNvSpPr>
@@ -1888,7 +2021,7 @@
           <a:p>
             <a:fld id="{BA2C47C2-00A2-4FE4-90C9-AE59239C4E6C}" type="datetimeFigureOut">
               <a:rPr lang="zh-CN" altLang="en-US" smtClean="0"/>
-              <a:t>2015/4/9</a:t>
+              <a:t>2015/4/15</a:t>
             </a:fld>
             <a:endParaRPr lang="zh-CN" altLang="en-US"/>
           </a:p>
@@ -1896,7 +2029,7 @@
       </p:sp>
       <p:sp>
         <p:nvSpPr>
-          <p:cNvPr id="4" name="页脚占位符 3"/>
+          <p:cNvPr id="4" name="KSO_FT"/>
           <p:cNvSpPr>
             <a:spLocks noGrp="1"/>
           </p:cNvSpPr>
@@ -1915,7 +2048,7 @@
       </p:sp>
       <p:sp>
         <p:nvSpPr>
-          <p:cNvPr id="5" name="灯片编号占位符 4"/>
+          <p:cNvPr id="5" name="KSO_FN"/>
           <p:cNvSpPr>
             <a:spLocks noGrp="1"/>
           </p:cNvSpPr>
@@ -1939,7 +2072,7 @@
     </p:spTree>
     <p:extLst>
       <p:ext uri="{BB962C8B-B14F-4D97-AF65-F5344CB8AC3E}">
-        <p14:creationId xmlns:p14="http://schemas.microsoft.com/office/powerpoint/2010/main" val="3782112694"/>
+        <p14:creationId xmlns:p14="http://schemas.microsoft.com/office/powerpoint/2010/main" val="3976141846"/>
       </p:ext>
     </p:extLst>
   </p:cSld>
@@ -1968,7 +2101,7 @@
       </p:grpSpPr>
       <p:sp>
         <p:nvSpPr>
-          <p:cNvPr id="2" name="日期占位符 1"/>
+          <p:cNvPr id="2" name="KSO_FD"/>
           <p:cNvSpPr>
             <a:spLocks noGrp="1"/>
           </p:cNvSpPr>
@@ -1983,7 +2116,7 @@
           <a:p>
             <a:fld id="{BA2C47C2-00A2-4FE4-90C9-AE59239C4E6C}" type="datetimeFigureOut">
               <a:rPr lang="zh-CN" altLang="en-US" smtClean="0"/>
-              <a:t>2015/4/9</a:t>
+              <a:t>2015/4/15</a:t>
             </a:fld>
             <a:endParaRPr lang="zh-CN" altLang="en-US"/>
           </a:p>
@@ -1991,7 +2124,7 @@
       </p:sp>
       <p:sp>
         <p:nvSpPr>
-          <p:cNvPr id="3" name="页脚占位符 2"/>
+          <p:cNvPr id="3" name="KSO_FT"/>
           <p:cNvSpPr>
             <a:spLocks noGrp="1"/>
           </p:cNvSpPr>
@@ -2010,7 +2143,7 @@
       </p:sp>
       <p:sp>
         <p:nvSpPr>
-          <p:cNvPr id="4" name="灯片编号占位符 3"/>
+          <p:cNvPr id="4" name="KSO_FN"/>
           <p:cNvSpPr>
             <a:spLocks noGrp="1"/>
           </p:cNvSpPr>
@@ -2034,7 +2167,7 @@
     </p:spTree>
     <p:extLst>
       <p:ext uri="{BB962C8B-B14F-4D97-AF65-F5344CB8AC3E}">
-        <p14:creationId xmlns:p14="http://schemas.microsoft.com/office/powerpoint/2010/main" val="1659450539"/>
+        <p14:creationId xmlns:p14="http://schemas.microsoft.com/office/powerpoint/2010/main" val="1979444522"/>
       </p:ext>
     </p:extLst>
   </p:cSld>
@@ -2063,7 +2196,7 @@
       </p:grpSpPr>
       <p:sp>
         <p:nvSpPr>
-          <p:cNvPr id="2" name="标题 1"/>
+          <p:cNvPr id="2" name="KSO_BT1"/>
           <p:cNvSpPr>
             <a:spLocks noGrp="1"/>
           </p:cNvSpPr>
@@ -2073,15 +2206,15 @@
         </p:nvSpPr>
         <p:spPr>
           <a:xfrm>
-            <a:off x="457200" y="273050"/>
-            <a:ext cx="3008313" cy="1162050"/>
+            <a:off x="858443" y="533402"/>
+            <a:ext cx="2949178" cy="1600200"/>
           </a:xfrm>
         </p:spPr>
         <p:txBody>
           <a:bodyPr anchor="b"/>
           <a:lstStyle>
-            <a:lvl1pPr algn="l">
-              <a:defRPr sz="2000" b="1"/>
+            <a:lvl1pPr>
+              <a:defRPr sz="2400"/>
             </a:lvl1pPr>
           </a:lstStyle>
           <a:p>
@@ -2089,13 +2222,13 @@
               <a:rPr lang="zh-CN" altLang="en-US" smtClean="0"/>
               <a:t>单击此处编辑母版标题样式</a:t>
             </a:r>
-            <a:endParaRPr lang="zh-CN" altLang="en-US"/>
-          </a:p>
-        </p:txBody>
-      </p:sp>
-      <p:sp>
-        <p:nvSpPr>
-          <p:cNvPr id="3" name="内容占位符 2"/>
+            <a:endParaRPr lang="en-US" dirty="0"/>
+          </a:p>
+        </p:txBody>
+      </p:sp>
+      <p:sp>
+        <p:nvSpPr>
+          <p:cNvPr id="3" name="KSO_BC1"/>
           <p:cNvSpPr>
             <a:spLocks noGrp="1"/>
           </p:cNvSpPr>
@@ -2105,39 +2238,41 @@
         </p:nvSpPr>
         <p:spPr>
           <a:xfrm>
-            <a:off x="3575050" y="273050"/>
-            <a:ext cx="5111750" cy="5853113"/>
+            <a:off x="4115992" y="1063630"/>
+            <a:ext cx="4629150" cy="4873625"/>
           </a:xfrm>
         </p:spPr>
         <p:txBody>
-          <a:bodyPr/>
+          <a:bodyPr>
+            <a:normAutofit/>
+          </a:bodyPr>
           <a:lstStyle>
             <a:lvl1pPr>
-              <a:defRPr sz="3200"/>
+              <a:defRPr sz="1500"/>
             </a:lvl1pPr>
             <a:lvl2pPr>
-              <a:defRPr sz="2800"/>
+              <a:defRPr sz="1350"/>
             </a:lvl2pPr>
             <a:lvl3pPr>
-              <a:defRPr sz="2400"/>
+              <a:defRPr sz="1200"/>
             </a:lvl3pPr>
             <a:lvl4pPr>
-              <a:defRPr sz="2000"/>
+              <a:defRPr sz="1050"/>
             </a:lvl4pPr>
             <a:lvl5pPr>
-              <a:defRPr sz="2000"/>
+              <a:defRPr sz="1050"/>
             </a:lvl5pPr>
             <a:lvl6pPr>
-              <a:defRPr sz="2000"/>
+              <a:defRPr sz="1500"/>
             </a:lvl6pPr>
             <a:lvl7pPr>
-              <a:defRPr sz="2000"/>
+              <a:defRPr sz="1500"/>
             </a:lvl7pPr>
             <a:lvl8pPr>
-              <a:defRPr sz="2000"/>
+              <a:defRPr sz="1500"/>
             </a:lvl8pPr>
             <a:lvl9pPr>
-              <a:defRPr sz="2000"/>
+              <a:defRPr sz="1500"/>
             </a:lvl9pPr>
           </a:lstStyle>
           <a:p>
@@ -2154,33 +2289,11 @@
               <a:t>第二级</a:t>
             </a:r>
           </a:p>
-          <a:p>
-            <a:pPr lvl="2"/>
-            <a:r>
-              <a:rPr lang="zh-CN" altLang="en-US" smtClean="0"/>
-              <a:t>第三级</a:t>
-            </a:r>
-          </a:p>
-          <a:p>
-            <a:pPr lvl="3"/>
-            <a:r>
-              <a:rPr lang="zh-CN" altLang="en-US" smtClean="0"/>
-              <a:t>第四级</a:t>
-            </a:r>
-          </a:p>
-          <a:p>
-            <a:pPr lvl="4"/>
-            <a:r>
-              <a:rPr lang="zh-CN" altLang="en-US" smtClean="0"/>
-              <a:t>第五级</a:t>
-            </a:r>
-            <a:endParaRPr lang="zh-CN" altLang="en-US"/>
-          </a:p>
-        </p:txBody>
-      </p:sp>
-      <p:sp>
-        <p:nvSpPr>
-          <p:cNvPr id="4" name="文本占位符 3"/>
+        </p:txBody>
+      </p:sp>
+      <p:sp>
+        <p:nvSpPr>
+          <p:cNvPr id="4" name="KSO_BC2"/>
           <p:cNvSpPr>
             <a:spLocks noGrp="1"/>
           </p:cNvSpPr>
@@ -2190,8 +2303,8 @@
         </p:nvSpPr>
         <p:spPr>
           <a:xfrm>
-            <a:off x="457200" y="1435100"/>
-            <a:ext cx="3008313" cy="4691063"/>
+            <a:off x="858443" y="2133602"/>
+            <a:ext cx="2949178" cy="3811588"/>
           </a:xfrm>
         </p:spPr>
         <p:txBody>
@@ -2199,39 +2312,39 @@
           <a:lstStyle>
             <a:lvl1pPr marL="0" indent="0">
               <a:buNone/>
-              <a:defRPr sz="1400"/>
+              <a:defRPr sz="1200"/>
             </a:lvl1pPr>
-            <a:lvl2pPr marL="457200" indent="0">
-              <a:buNone/>
-              <a:defRPr sz="1200"/>
+            <a:lvl2pPr marL="342900" indent="0">
+              <a:buNone/>
+              <a:defRPr sz="1050"/>
             </a:lvl2pPr>
-            <a:lvl3pPr marL="914400" indent="0">
-              <a:buNone/>
-              <a:defRPr sz="1000"/>
+            <a:lvl3pPr marL="685800" indent="0">
+              <a:buNone/>
+              <a:defRPr sz="900"/>
             </a:lvl3pPr>
-            <a:lvl4pPr marL="1371600" indent="0">
-              <a:buNone/>
-              <a:defRPr sz="900"/>
+            <a:lvl4pPr marL="1028700" indent="0">
+              <a:buNone/>
+              <a:defRPr sz="750"/>
             </a:lvl4pPr>
-            <a:lvl5pPr marL="1828800" indent="0">
-              <a:buNone/>
-              <a:defRPr sz="900"/>
+            <a:lvl5pPr marL="1371600" indent="0">
+              <a:buNone/>
+              <a:defRPr sz="750"/>
             </a:lvl5pPr>
-            <a:lvl6pPr marL="2286000" indent="0">
-              <a:buNone/>
-              <a:defRPr sz="900"/>
+            <a:lvl6pPr marL="1714500" indent="0">
+              <a:buNone/>
+              <a:defRPr sz="750"/>
             </a:lvl6pPr>
-            <a:lvl7pPr marL="2743200" indent="0">
-              <a:buNone/>
-              <a:defRPr sz="900"/>
+            <a:lvl7pPr marL="2057400" indent="0">
+              <a:buNone/>
+              <a:defRPr sz="750"/>
             </a:lvl7pPr>
-            <a:lvl8pPr marL="3200400" indent="0">
-              <a:buNone/>
-              <a:defRPr sz="900"/>
+            <a:lvl8pPr marL="2400300" indent="0">
+              <a:buNone/>
+              <a:defRPr sz="750"/>
             </a:lvl8pPr>
-            <a:lvl9pPr marL="3657600" indent="0">
-              <a:buNone/>
-              <a:defRPr sz="900"/>
+            <a:lvl9pPr marL="2743200" indent="0">
+              <a:buNone/>
+              <a:defRPr sz="750"/>
             </a:lvl9pPr>
           </a:lstStyle>
           <a:p>
@@ -2245,7 +2358,7 @@
       </p:sp>
       <p:sp>
         <p:nvSpPr>
-          <p:cNvPr id="5" name="日期占位符 4"/>
+          <p:cNvPr id="5" name="KSO_FD"/>
           <p:cNvSpPr>
             <a:spLocks noGrp="1"/>
           </p:cNvSpPr>
@@ -2260,7 +2373,7 @@
           <a:p>
             <a:fld id="{BA2C47C2-00A2-4FE4-90C9-AE59239C4E6C}" type="datetimeFigureOut">
               <a:rPr lang="zh-CN" altLang="en-US" smtClean="0"/>
-              <a:t>2015/4/9</a:t>
+              <a:t>2015/4/15</a:t>
             </a:fld>
             <a:endParaRPr lang="zh-CN" altLang="en-US"/>
           </a:p>
@@ -2268,7 +2381,7 @@
       </p:sp>
       <p:sp>
         <p:nvSpPr>
-          <p:cNvPr id="6" name="页脚占位符 5"/>
+          <p:cNvPr id="6" name="KSO_FT"/>
           <p:cNvSpPr>
             <a:spLocks noGrp="1"/>
           </p:cNvSpPr>
@@ -2287,7 +2400,7 @@
       </p:sp>
       <p:sp>
         <p:nvSpPr>
-          <p:cNvPr id="7" name="灯片编号占位符 6"/>
+          <p:cNvPr id="7" name="KSO_FN"/>
           <p:cNvSpPr>
             <a:spLocks noGrp="1"/>
           </p:cNvSpPr>
@@ -2311,7 +2424,7 @@
     </p:spTree>
     <p:extLst>
       <p:ext uri="{BB962C8B-B14F-4D97-AF65-F5344CB8AC3E}">
-        <p14:creationId xmlns:p14="http://schemas.microsoft.com/office/powerpoint/2010/main" val="717691144"/>
+        <p14:creationId xmlns:p14="http://schemas.microsoft.com/office/powerpoint/2010/main" val="3868988485"/>
       </p:ext>
     </p:extLst>
   </p:cSld>
@@ -2340,7 +2453,7 @@
       </p:grpSpPr>
       <p:sp>
         <p:nvSpPr>
-          <p:cNvPr id="2" name="标题 1"/>
+          <p:cNvPr id="2" name="KSO_BT1"/>
           <p:cNvSpPr>
             <a:spLocks noGrp="1"/>
           </p:cNvSpPr>
@@ -2350,15 +2463,15 @@
         </p:nvSpPr>
         <p:spPr>
           <a:xfrm>
-            <a:off x="1792288" y="4800600"/>
-            <a:ext cx="5486400" cy="566738"/>
+            <a:off x="934644" y="457200"/>
+            <a:ext cx="2949178" cy="1600200"/>
           </a:xfrm>
         </p:spPr>
         <p:txBody>
           <a:bodyPr anchor="b"/>
           <a:lstStyle>
-            <a:lvl1pPr algn="l">
-              <a:defRPr sz="2000" b="1"/>
+            <a:lvl1pPr>
+              <a:defRPr sz="2400"/>
             </a:lvl1pPr>
           </a:lstStyle>
           <a:p>
@@ -2366,15 +2479,15 @@
               <a:rPr lang="zh-CN" altLang="en-US" smtClean="0"/>
               <a:t>单击此处编辑母版标题样式</a:t>
             </a:r>
-            <a:endParaRPr lang="zh-CN" altLang="en-US"/>
-          </a:p>
-        </p:txBody>
-      </p:sp>
-      <p:sp>
-        <p:nvSpPr>
-          <p:cNvPr id="3" name="图片占位符 2"/>
-          <p:cNvSpPr>
-            <a:spLocks noGrp="1"/>
+            <a:endParaRPr lang="en-US" dirty="0"/>
+          </a:p>
+        </p:txBody>
+      </p:sp>
+      <p:sp>
+        <p:nvSpPr>
+          <p:cNvPr id="3" name="KSO_BC1"/>
+          <p:cNvSpPr>
+            <a:spLocks noGrp="1" noChangeAspect="1"/>
           </p:cNvSpPr>
           <p:nvPr>
             <p:ph type="pic" idx="1"/>
@@ -2382,58 +2495,62 @@
         </p:nvSpPr>
         <p:spPr>
           <a:xfrm>
-            <a:off x="1792288" y="612775"/>
-            <a:ext cx="5486400" cy="4114800"/>
+            <a:off x="4082125" y="987428"/>
+            <a:ext cx="4629150" cy="4873625"/>
           </a:xfrm>
         </p:spPr>
         <p:txBody>
-          <a:bodyPr/>
+          <a:bodyPr anchor="t"/>
           <a:lstStyle>
             <a:lvl1pPr marL="0" indent="0">
               <a:buNone/>
-              <a:defRPr sz="3200"/>
+              <a:defRPr sz="2400"/>
             </a:lvl1pPr>
-            <a:lvl2pPr marL="457200" indent="0">
-              <a:buNone/>
-              <a:defRPr sz="2800"/>
+            <a:lvl2pPr marL="342900" indent="0">
+              <a:buNone/>
+              <a:defRPr sz="2100"/>
             </a:lvl2pPr>
-            <a:lvl3pPr marL="914400" indent="0">
-              <a:buNone/>
-              <a:defRPr sz="2400"/>
+            <a:lvl3pPr marL="685800" indent="0">
+              <a:buNone/>
+              <a:defRPr sz="1800"/>
             </a:lvl3pPr>
-            <a:lvl4pPr marL="1371600" indent="0">
-              <a:buNone/>
-              <a:defRPr sz="2000"/>
+            <a:lvl4pPr marL="1028700" indent="0">
+              <a:buNone/>
+              <a:defRPr sz="1500"/>
             </a:lvl4pPr>
-            <a:lvl5pPr marL="1828800" indent="0">
-              <a:buNone/>
-              <a:defRPr sz="2000"/>
+            <a:lvl5pPr marL="1371600" indent="0">
+              <a:buNone/>
+              <a:defRPr sz="1500"/>
             </a:lvl5pPr>
-            <a:lvl6pPr marL="2286000" indent="0">
-              <a:buNone/>
-              <a:defRPr sz="2000"/>
+            <a:lvl6pPr marL="1714500" indent="0">
+              <a:buNone/>
+              <a:defRPr sz="1500"/>
             </a:lvl6pPr>
-            <a:lvl7pPr marL="2743200" indent="0">
-              <a:buNone/>
-              <a:defRPr sz="2000"/>
+            <a:lvl7pPr marL="2057400" indent="0">
+              <a:buNone/>
+              <a:defRPr sz="1500"/>
             </a:lvl7pPr>
-            <a:lvl8pPr marL="3200400" indent="0">
-              <a:buNone/>
-              <a:defRPr sz="2000"/>
+            <a:lvl8pPr marL="2400300" indent="0">
+              <a:buNone/>
+              <a:defRPr sz="1500"/>
             </a:lvl8pPr>
-            <a:lvl9pPr marL="3657600" indent="0">
-              <a:buNone/>
-              <a:defRPr sz="2000"/>
+            <a:lvl9pPr marL="2743200" indent="0">
+              <a:buNone/>
+              <a:defRPr sz="1500"/>
             </a:lvl9pPr>
           </a:lstStyle>
           <a:p>
-            <a:endParaRPr lang="zh-CN" altLang="en-US"/>
-          </a:p>
-        </p:txBody>
-      </p:sp>
-      <p:sp>
-        <p:nvSpPr>
-          <p:cNvPr id="4" name="文本占位符 3"/>
+            <a:r>
+              <a:rPr lang="zh-CN" altLang="en-US" smtClean="0"/>
+              <a:t>单击图标添加图片</a:t>
+            </a:r>
+            <a:endParaRPr lang="en-US" dirty="0"/>
+          </a:p>
+        </p:txBody>
+      </p:sp>
+      <p:sp>
+        <p:nvSpPr>
+          <p:cNvPr id="4" name="KSO_BC2"/>
           <p:cNvSpPr>
             <a:spLocks noGrp="1"/>
           </p:cNvSpPr>
@@ -2443,8 +2560,8 @@
         </p:nvSpPr>
         <p:spPr>
           <a:xfrm>
-            <a:off x="1792288" y="5367338"/>
-            <a:ext cx="5486400" cy="804862"/>
+            <a:off x="934644" y="2057400"/>
+            <a:ext cx="2949178" cy="3811588"/>
           </a:xfrm>
         </p:spPr>
         <p:txBody>
@@ -2452,39 +2569,39 @@
           <a:lstStyle>
             <a:lvl1pPr marL="0" indent="0">
               <a:buNone/>
-              <a:defRPr sz="1400"/>
+              <a:defRPr sz="1200"/>
             </a:lvl1pPr>
-            <a:lvl2pPr marL="457200" indent="0">
-              <a:buNone/>
-              <a:defRPr sz="1200"/>
+            <a:lvl2pPr marL="342900" indent="0">
+              <a:buNone/>
+              <a:defRPr sz="1050"/>
             </a:lvl2pPr>
-            <a:lvl3pPr marL="914400" indent="0">
-              <a:buNone/>
-              <a:defRPr sz="1000"/>
+            <a:lvl3pPr marL="685800" indent="0">
+              <a:buNone/>
+              <a:defRPr sz="900"/>
             </a:lvl3pPr>
-            <a:lvl4pPr marL="1371600" indent="0">
-              <a:buNone/>
-              <a:defRPr sz="900"/>
+            <a:lvl4pPr marL="1028700" indent="0">
+              <a:buNone/>
+              <a:defRPr sz="750"/>
             </a:lvl4pPr>
-            <a:lvl5pPr marL="1828800" indent="0">
-              <a:buNone/>
-              <a:defRPr sz="900"/>
+            <a:lvl5pPr marL="1371600" indent="0">
+              <a:buNone/>
+              <a:defRPr sz="750"/>
             </a:lvl5pPr>
-            <a:lvl6pPr marL="2286000" indent="0">
-              <a:buNone/>
-              <a:defRPr sz="900"/>
+            <a:lvl6pPr marL="1714500" indent="0">
+              <a:buNone/>
+              <a:defRPr sz="750"/>
             </a:lvl6pPr>
-            <a:lvl7pPr marL="2743200" indent="0">
-              <a:buNone/>
-              <a:defRPr sz="900"/>
+            <a:lvl7pPr marL="2057400" indent="0">
+              <a:buNone/>
+              <a:defRPr sz="750"/>
             </a:lvl7pPr>
-            <a:lvl8pPr marL="3200400" indent="0">
-              <a:buNone/>
-              <a:defRPr sz="900"/>
+            <a:lvl8pPr marL="2400300" indent="0">
+              <a:buNone/>
+              <a:defRPr sz="750"/>
             </a:lvl8pPr>
-            <a:lvl9pPr marL="3657600" indent="0">
-              <a:buNone/>
-              <a:defRPr sz="900"/>
+            <a:lvl9pPr marL="2743200" indent="0">
+              <a:buNone/>
+              <a:defRPr sz="750"/>
             </a:lvl9pPr>
           </a:lstStyle>
           <a:p>
@@ -2498,7 +2615,7 @@
       </p:sp>
       <p:sp>
         <p:nvSpPr>
-          <p:cNvPr id="5" name="日期占位符 4"/>
+          <p:cNvPr id="5" name="KSO_FD"/>
           <p:cNvSpPr>
             <a:spLocks noGrp="1"/>
           </p:cNvSpPr>
@@ -2513,7 +2630,7 @@
           <a:p>
             <a:fld id="{BA2C47C2-00A2-4FE4-90C9-AE59239C4E6C}" type="datetimeFigureOut">
               <a:rPr lang="zh-CN" altLang="en-US" smtClean="0"/>
-              <a:t>2015/4/9</a:t>
+              <a:t>2015/4/15</a:t>
             </a:fld>
             <a:endParaRPr lang="zh-CN" altLang="en-US"/>
           </a:p>
@@ -2521,7 +2638,7 @@
       </p:sp>
       <p:sp>
         <p:nvSpPr>
-          <p:cNvPr id="6" name="页脚占位符 5"/>
+          <p:cNvPr id="6" name="KSO_FT"/>
           <p:cNvSpPr>
             <a:spLocks noGrp="1"/>
           </p:cNvSpPr>
@@ -2540,7 +2657,7 @@
       </p:sp>
       <p:sp>
         <p:nvSpPr>
-          <p:cNvPr id="7" name="灯片编号占位符 6"/>
+          <p:cNvPr id="7" name="KSO_FN"/>
           <p:cNvSpPr>
             <a:spLocks noGrp="1"/>
           </p:cNvSpPr>
@@ -2564,7 +2681,7 @@
     </p:spTree>
     <p:extLst>
       <p:ext uri="{BB962C8B-B14F-4D97-AF65-F5344CB8AC3E}">
-        <p14:creationId xmlns:p14="http://schemas.microsoft.com/office/powerpoint/2010/main" val="4006566716"/>
+        <p14:creationId xmlns:p14="http://schemas.microsoft.com/office/powerpoint/2010/main" val="3492331715"/>
       </p:ext>
     </p:extLst>
   </p:cSld>
@@ -2596,125 +2713,59 @@
           <a:chExt cx="0" cy="0"/>
         </a:xfrm>
       </p:grpSpPr>
-      <p:sp>
-        <p:nvSpPr>
-          <p:cNvPr id="2" name="标题占位符 1"/>
-          <p:cNvSpPr>
-            <a:spLocks noGrp="1"/>
-          </p:cNvSpPr>
-          <p:nvPr>
-            <p:ph type="title"/>
-          </p:nvPr>
-        </p:nvSpPr>
+      <p:pic>
+        <p:nvPicPr>
+          <p:cNvPr id="8" name="图片 7"/>
+          <p:cNvPicPr>
+            <a:picLocks noChangeAspect="1"/>
+          </p:cNvPicPr>
+          <p:nvPr/>
+        </p:nvPicPr>
+        <p:blipFill rotWithShape="1">
+          <a:blip r:embed="rId13">
+            <a:extLst>
+              <a:ext uri="{28A0092B-C50C-407E-A947-70E740481C1C}">
+                <a14:useLocalDpi xmlns:a14="http://schemas.microsoft.com/office/drawing/2010/main" val="0"/>
+              </a:ext>
+            </a:extLst>
+          </a:blip>
+          <a:srcRect l="11265" t="365" r="2852" b="887"/>
+          <a:stretch/>
+        </p:blipFill>
         <p:spPr>
           <a:xfrm>
-            <a:off x="457200" y="274638"/>
-            <a:ext cx="8229600" cy="1143000"/>
+            <a:off x="0" y="0"/>
+            <a:ext cx="9135836" cy="6858000"/>
           </a:xfrm>
           <a:prstGeom prst="rect">
             <a:avLst/>
           </a:prstGeom>
         </p:spPr>
-        <p:txBody>
-          <a:bodyPr vert="horz" lIns="91440" tIns="45720" rIns="91440" bIns="45720" rtlCol="0" anchor="ctr">
-            <a:normAutofit/>
-          </a:bodyPr>
-          <a:lstStyle/>
-          <a:p>
-            <a:r>
-              <a:rPr lang="zh-CN" altLang="en-US" smtClean="0"/>
-              <a:t>单击此处编辑母版标题样式</a:t>
-            </a:r>
-            <a:endParaRPr lang="zh-CN" altLang="en-US"/>
-          </a:p>
-        </p:txBody>
-      </p:sp>
-      <p:sp>
-        <p:nvSpPr>
-          <p:cNvPr id="3" name="文本占位符 2"/>
-          <p:cNvSpPr>
-            <a:spLocks noGrp="1"/>
-          </p:cNvSpPr>
-          <p:nvPr>
-            <p:ph type="body" idx="1"/>
+      </p:pic>
+      <p:sp>
+        <p:nvSpPr>
+          <p:cNvPr id="4" name="KSO_FD"/>
+          <p:cNvSpPr>
+            <a:spLocks noGrp="1"/>
+          </p:cNvSpPr>
+          <p:nvPr>
+            <p:ph type="dt" sz="half" idx="2"/>
           </p:nvPr>
         </p:nvSpPr>
         <p:spPr>
           <a:xfrm>
-            <a:off x="457200" y="1600200"/>
-            <a:ext cx="8229600" cy="4525963"/>
+            <a:off x="628650" y="6356353"/>
+            <a:ext cx="2057400" cy="365125"/>
           </a:xfrm>
           <a:prstGeom prst="rect">
             <a:avLst/>
           </a:prstGeom>
         </p:spPr>
         <p:txBody>
-          <a:bodyPr vert="horz" lIns="91440" tIns="45720" rIns="91440" bIns="45720" rtlCol="0">
-            <a:normAutofit/>
-          </a:bodyPr>
-          <a:lstStyle/>
-          <a:p>
-            <a:pPr lvl="0"/>
-            <a:r>
-              <a:rPr lang="zh-CN" altLang="en-US" smtClean="0"/>
-              <a:t>单击此处编辑母版文本样式</a:t>
-            </a:r>
-          </a:p>
-          <a:p>
-            <a:pPr lvl="1"/>
-            <a:r>
-              <a:rPr lang="zh-CN" altLang="en-US" smtClean="0"/>
-              <a:t>第二级</a:t>
-            </a:r>
-          </a:p>
-          <a:p>
-            <a:pPr lvl="2"/>
-            <a:r>
-              <a:rPr lang="zh-CN" altLang="en-US" smtClean="0"/>
-              <a:t>第三级</a:t>
-            </a:r>
-          </a:p>
-          <a:p>
-            <a:pPr lvl="3"/>
-            <a:r>
-              <a:rPr lang="zh-CN" altLang="en-US" smtClean="0"/>
-              <a:t>第四级</a:t>
-            </a:r>
-          </a:p>
-          <a:p>
-            <a:pPr lvl="4"/>
-            <a:r>
-              <a:rPr lang="zh-CN" altLang="en-US" smtClean="0"/>
-              <a:t>第五级</a:t>
-            </a:r>
-            <a:endParaRPr lang="zh-CN" altLang="en-US"/>
-          </a:p>
-        </p:txBody>
-      </p:sp>
-      <p:sp>
-        <p:nvSpPr>
-          <p:cNvPr id="4" name="日期占位符 3"/>
-          <p:cNvSpPr>
-            <a:spLocks noGrp="1"/>
-          </p:cNvSpPr>
-          <p:nvPr>
-            <p:ph type="dt" sz="half" idx="2"/>
-          </p:nvPr>
-        </p:nvSpPr>
-        <p:spPr>
-          <a:xfrm>
-            <a:off x="457200" y="6356350"/>
-            <a:ext cx="2133600" cy="365125"/>
-          </a:xfrm>
-          <a:prstGeom prst="rect">
-            <a:avLst/>
-          </a:prstGeom>
-        </p:spPr>
-        <p:txBody>
           <a:bodyPr vert="horz" lIns="91440" tIns="45720" rIns="91440" bIns="45720" rtlCol="0" anchor="ctr"/>
           <a:lstStyle>
             <a:lvl1pPr algn="l">
-              <a:defRPr sz="1200">
+              <a:defRPr sz="900">
                 <a:solidFill>
                   <a:schemeClr val="tx1">
                     <a:tint val="75000"/>
@@ -2726,7 +2777,7 @@
           <a:p>
             <a:fld id="{BA2C47C2-00A2-4FE4-90C9-AE59239C4E6C}" type="datetimeFigureOut">
               <a:rPr lang="zh-CN" altLang="en-US" smtClean="0"/>
-              <a:t>2015/4/9</a:t>
+              <a:t>2015/4/15</a:t>
             </a:fld>
             <a:endParaRPr lang="zh-CN" altLang="en-US"/>
           </a:p>
@@ -2734,7 +2785,7 @@
       </p:sp>
       <p:sp>
         <p:nvSpPr>
-          <p:cNvPr id="5" name="页脚占位符 4"/>
+          <p:cNvPr id="5" name="KSO_FT"/>
           <p:cNvSpPr>
             <a:spLocks noGrp="1"/>
           </p:cNvSpPr>
@@ -2744,8 +2795,8 @@
         </p:nvSpPr>
         <p:spPr>
           <a:xfrm>
-            <a:off x="3124200" y="6356350"/>
-            <a:ext cx="2895600" cy="365125"/>
+            <a:off x="3028950" y="6356353"/>
+            <a:ext cx="3086100" cy="365125"/>
           </a:xfrm>
           <a:prstGeom prst="rect">
             <a:avLst/>
@@ -2755,7 +2806,7 @@
           <a:bodyPr vert="horz" lIns="91440" tIns="45720" rIns="91440" bIns="45720" rtlCol="0" anchor="ctr"/>
           <a:lstStyle>
             <a:lvl1pPr algn="ctr">
-              <a:defRPr sz="1200">
+              <a:defRPr sz="900">
                 <a:solidFill>
                   <a:schemeClr val="tx1">
                     <a:tint val="75000"/>
@@ -2771,7 +2822,7 @@
       </p:sp>
       <p:sp>
         <p:nvSpPr>
-          <p:cNvPr id="6" name="灯片编号占位符 5"/>
+          <p:cNvPr id="6" name="KSO_FN"/>
           <p:cNvSpPr>
             <a:spLocks noGrp="1"/>
           </p:cNvSpPr>
@@ -2781,8 +2832,8 @@
         </p:nvSpPr>
         <p:spPr>
           <a:xfrm>
-            <a:off x="6553200" y="6356350"/>
-            <a:ext cx="2133600" cy="365125"/>
+            <a:off x="6457950" y="6356353"/>
+            <a:ext cx="2057400" cy="365125"/>
           </a:xfrm>
           <a:prstGeom prst="rect">
             <a:avLst/>
@@ -2792,7 +2843,7 @@
           <a:bodyPr vert="horz" lIns="91440" tIns="45720" rIns="91440" bIns="45720" rtlCol="0" anchor="ctr"/>
           <a:lstStyle>
             <a:lvl1pPr algn="r">
-              <a:defRPr sz="1200">
+              <a:defRPr sz="900">
                 <a:solidFill>
                   <a:schemeClr val="tx1">
                     <a:tint val="75000"/>
@@ -2810,82 +2861,184 @@
           </a:p>
         </p:txBody>
       </p:sp>
+      <p:sp>
+        <p:nvSpPr>
+          <p:cNvPr id="2" name="KSO_BT1"/>
+          <p:cNvSpPr>
+            <a:spLocks noGrp="1"/>
+          </p:cNvSpPr>
+          <p:nvPr>
+            <p:ph type="title"/>
+          </p:nvPr>
+        </p:nvSpPr>
+        <p:spPr>
+          <a:xfrm>
+            <a:off x="419099" y="169415"/>
+            <a:ext cx="8292045" cy="796011"/>
+          </a:xfrm>
+          <a:prstGeom prst="rect">
+            <a:avLst/>
+          </a:prstGeom>
+        </p:spPr>
+        <p:txBody>
+          <a:bodyPr vert="horz" lIns="91440" tIns="45720" rIns="91440" bIns="45720" rtlCol="0" anchor="b">
+            <a:normAutofit/>
+          </a:bodyPr>
+          <a:lstStyle/>
+          <a:p>
+            <a:r>
+              <a:rPr lang="zh-CN" altLang="en-US" dirty="0" smtClean="0"/>
+              <a:t>单击此处编辑母版标题样式</a:t>
+            </a:r>
+            <a:endParaRPr lang="en-US" dirty="0"/>
+          </a:p>
+        </p:txBody>
+      </p:sp>
+      <p:sp>
+        <p:nvSpPr>
+          <p:cNvPr id="3" name="KSO_BC1"/>
+          <p:cNvSpPr>
+            <a:spLocks noGrp="1"/>
+          </p:cNvSpPr>
+          <p:nvPr>
+            <p:ph type="body" idx="1"/>
+          </p:nvPr>
+        </p:nvSpPr>
+        <p:spPr>
+          <a:xfrm>
+            <a:off x="419099" y="1419225"/>
+            <a:ext cx="8292045" cy="4863104"/>
+          </a:xfrm>
+          <a:prstGeom prst="rect">
+            <a:avLst/>
+          </a:prstGeom>
+        </p:spPr>
+        <p:txBody>
+          <a:bodyPr vert="horz" lIns="91440" tIns="45720" rIns="91440" bIns="45720" rtlCol="0">
+            <a:normAutofit/>
+          </a:bodyPr>
+          <a:lstStyle/>
+          <a:p>
+            <a:pPr lvl="0"/>
+            <a:r>
+              <a:rPr lang="zh-CN" altLang="en-US" dirty="0" smtClean="0"/>
+              <a:t>单击此处编辑母版文本样式</a:t>
+            </a:r>
+          </a:p>
+          <a:p>
+            <a:pPr lvl="1"/>
+            <a:r>
+              <a:rPr lang="zh-CN" altLang="en-US" dirty="0" smtClean="0"/>
+              <a:t>第二级</a:t>
+            </a:r>
+          </a:p>
+        </p:txBody>
+      </p:sp>
     </p:spTree>
     <p:extLst>
       <p:ext uri="{BB962C8B-B14F-4D97-AF65-F5344CB8AC3E}">
-        <p14:creationId xmlns:p14="http://schemas.microsoft.com/office/powerpoint/2010/main" val="758707917"/>
+        <p14:creationId xmlns:p14="http://schemas.microsoft.com/office/powerpoint/2010/main" val="2520182236"/>
       </p:ext>
     </p:extLst>
   </p:cSld>
   <p:clrMap bg1="lt1" tx1="dk1" bg2="lt2" tx2="dk2" accent1="accent1" accent2="accent2" accent3="accent3" accent4="accent4" accent5="accent5" accent6="accent6" hlink="hlink" folHlink="folHlink"/>
   <p:sldLayoutIdLst>
-    <p:sldLayoutId id="2147483649" r:id="rId1"/>
-    <p:sldLayoutId id="2147483650" r:id="rId2"/>
-    <p:sldLayoutId id="2147483651" r:id="rId3"/>
-    <p:sldLayoutId id="2147483652" r:id="rId4"/>
-    <p:sldLayoutId id="2147483653" r:id="rId5"/>
-    <p:sldLayoutId id="2147483654" r:id="rId6"/>
-    <p:sldLayoutId id="2147483655" r:id="rId7"/>
-    <p:sldLayoutId id="2147483656" r:id="rId8"/>
-    <p:sldLayoutId id="2147483657" r:id="rId9"/>
-    <p:sldLayoutId id="2147483658" r:id="rId10"/>
-    <p:sldLayoutId id="2147483659" r:id="rId11"/>
+    <p:sldLayoutId id="2147483661" r:id="rId1"/>
+    <p:sldLayoutId id="2147483662" r:id="rId2"/>
+    <p:sldLayoutId id="2147483663" r:id="rId3"/>
+    <p:sldLayoutId id="2147483664" r:id="rId4"/>
+    <p:sldLayoutId id="2147483665" r:id="rId5"/>
+    <p:sldLayoutId id="2147483666" r:id="rId6"/>
+    <p:sldLayoutId id="2147483667" r:id="rId7"/>
+    <p:sldLayoutId id="2147483668" r:id="rId8"/>
+    <p:sldLayoutId id="2147483669" r:id="rId9"/>
+    <p:sldLayoutId id="2147483670" r:id="rId10"/>
+    <p:sldLayoutId id="2147483671" r:id="rId11"/>
   </p:sldLayoutIdLst>
   <p:txStyles>
     <p:titleStyle>
-      <a:lvl1pPr algn="ctr" defTabSz="914400" rtl="0" eaLnBrk="1" latinLnBrk="0" hangingPunct="1">
+      <a:lvl1pPr algn="l" defTabSz="685800" rtl="0" eaLnBrk="1" latinLnBrk="0" hangingPunct="1">
+        <a:lnSpc>
+          <a:spcPct val="90000"/>
+        </a:lnSpc>
         <a:spcBef>
           <a:spcPct val="0"/>
         </a:spcBef>
         <a:buNone/>
-        <a:defRPr sz="4400" kern="1200">
+        <a:defRPr sz="3200" b="1" i="0" kern="1200" baseline="0">
           <a:solidFill>
             <a:schemeClr val="tx1"/>
           </a:solidFill>
-          <a:latin typeface="+mj-lt"/>
+          <a:effectLst/>
+          <a:latin typeface="+mj-ea"/>
           <a:ea typeface="+mj-ea"/>
           <a:cs typeface="+mj-cs"/>
         </a:defRPr>
       </a:lvl1pPr>
     </p:titleStyle>
     <p:bodyStyle>
-      <a:lvl1pPr marL="342900" indent="-342900" algn="l" defTabSz="914400" rtl="0" eaLnBrk="1" latinLnBrk="0" hangingPunct="1">
+      <a:lvl1pPr marL="267891" indent="-267891" algn="just" defTabSz="685800" rtl="0" eaLnBrk="1" latinLnBrk="0" hangingPunct="1">
+        <a:lnSpc>
+          <a:spcPct val="110000"/>
+        </a:lnSpc>
         <a:spcBef>
-          <a:spcPct val="20000"/>
+          <a:spcPts val="450"/>
         </a:spcBef>
-        <a:buFont typeface="Arial" pitchFamily="34" charset="0"/>
-        <a:buChar char="•"/>
-        <a:defRPr sz="3200" kern="1200">
+        <a:spcAft>
+          <a:spcPts val="0"/>
+        </a:spcAft>
+        <a:buClr>
+          <a:schemeClr val="accent1"/>
+        </a:buClr>
+        <a:buSzPct val="60000"/>
+        <a:buFont typeface="Wingdings 3" panose="05040102010807070707" pitchFamily="18" charset="2"/>
+        <a:buChar char=""/>
+        <a:defRPr lang="zh-CN" altLang="en-US" sz="2400" kern="1200" baseline="0" dirty="0" smtClean="0">
           <a:solidFill>
-            <a:schemeClr val="tx1"/>
+            <a:schemeClr val="accent1"/>
           </a:solidFill>
-          <a:latin typeface="+mn-lt"/>
+          <a:latin typeface="+mn-ea"/>
           <a:ea typeface="+mn-ea"/>
           <a:cs typeface="+mn-cs"/>
         </a:defRPr>
       </a:lvl1pPr>
-      <a:lvl2pPr marL="742950" indent="-285750" algn="l" defTabSz="914400" rtl="0" eaLnBrk="1" latinLnBrk="0" hangingPunct="1">
+      <a:lvl2pPr marL="267891" indent="-267891" algn="just" defTabSz="685800" rtl="0" eaLnBrk="1" latinLnBrk="0" hangingPunct="1">
+        <a:lnSpc>
+          <a:spcPct val="120000"/>
+        </a:lnSpc>
         <a:spcBef>
-          <a:spcPct val="20000"/>
+          <a:spcPts val="0"/>
         </a:spcBef>
-        <a:buFont typeface="Arial" pitchFamily="34" charset="0"/>
-        <a:buChar char="–"/>
-        <a:defRPr sz="2800" kern="1200">
+        <a:spcAft>
+          <a:spcPts val="450"/>
+        </a:spcAft>
+        <a:buClr>
+          <a:schemeClr val="accent2">
+            <a:lumMod val="60000"/>
+            <a:lumOff val="40000"/>
+          </a:schemeClr>
+        </a:buClr>
+        <a:buFont typeface="幼圆" panose="02010509060101010101" pitchFamily="49" charset="-122"/>
+        <a:buChar char=" "/>
+        <a:defRPr sz="1600" kern="1200" baseline="0">
           <a:solidFill>
             <a:schemeClr val="tx1"/>
           </a:solidFill>
-          <a:latin typeface="+mn-lt"/>
+          <a:latin typeface="+mn-ea"/>
           <a:ea typeface="+mn-ea"/>
           <a:cs typeface="+mn-cs"/>
         </a:defRPr>
       </a:lvl2pPr>
-      <a:lvl3pPr marL="1143000" indent="-228600" algn="l" defTabSz="914400" rtl="0" eaLnBrk="1" latinLnBrk="0" hangingPunct="1">
+      <a:lvl3pPr marL="857250" indent="-171450" algn="l" defTabSz="685800" rtl="0" eaLnBrk="1" latinLnBrk="0" hangingPunct="1">
+        <a:lnSpc>
+          <a:spcPct val="90000"/>
+        </a:lnSpc>
         <a:spcBef>
-          <a:spcPct val="20000"/>
+          <a:spcPts val="375"/>
         </a:spcBef>
-        <a:buFont typeface="Arial" pitchFamily="34" charset="0"/>
+        <a:buFont typeface="Arial" panose="020B0604020202020204" pitchFamily="34" charset="0"/>
         <a:buChar char="•"/>
-        <a:defRPr sz="2400" kern="1200">
+        <a:defRPr sz="1500" kern="1200">
           <a:solidFill>
             <a:schemeClr val="tx1"/>
           </a:solidFill>
@@ -2894,13 +3047,16 @@
           <a:cs typeface="+mn-cs"/>
         </a:defRPr>
       </a:lvl3pPr>
-      <a:lvl4pPr marL="1600200" indent="-228600" algn="l" defTabSz="914400" rtl="0" eaLnBrk="1" latinLnBrk="0" hangingPunct="1">
+      <a:lvl4pPr marL="1200150" indent="-171450" algn="l" defTabSz="685800" rtl="0" eaLnBrk="1" latinLnBrk="0" hangingPunct="1">
+        <a:lnSpc>
+          <a:spcPct val="90000"/>
+        </a:lnSpc>
         <a:spcBef>
-          <a:spcPct val="20000"/>
+          <a:spcPts val="375"/>
         </a:spcBef>
-        <a:buFont typeface="Arial" pitchFamily="34" charset="0"/>
-        <a:buChar char="–"/>
-        <a:defRPr sz="2000" kern="1200">
+        <a:buFont typeface="Arial" panose="020B0604020202020204" pitchFamily="34" charset="0"/>
+        <a:buChar char="•"/>
+        <a:defRPr sz="1350" kern="1200">
           <a:solidFill>
             <a:schemeClr val="tx1"/>
           </a:solidFill>
@@ -2909,13 +3065,16 @@
           <a:cs typeface="+mn-cs"/>
         </a:defRPr>
       </a:lvl4pPr>
-      <a:lvl5pPr marL="2057400" indent="-228600" algn="l" defTabSz="914400" rtl="0" eaLnBrk="1" latinLnBrk="0" hangingPunct="1">
+      <a:lvl5pPr marL="1543050" indent="-171450" algn="l" defTabSz="685800" rtl="0" eaLnBrk="1" latinLnBrk="0" hangingPunct="1">
+        <a:lnSpc>
+          <a:spcPct val="90000"/>
+        </a:lnSpc>
         <a:spcBef>
-          <a:spcPct val="20000"/>
+          <a:spcPts val="375"/>
         </a:spcBef>
-        <a:buFont typeface="Arial" pitchFamily="34" charset="0"/>
-        <a:buChar char="»"/>
-        <a:defRPr sz="2000" kern="1200">
+        <a:buFont typeface="Arial" panose="020B0604020202020204" pitchFamily="34" charset="0"/>
+        <a:buChar char="•"/>
+        <a:defRPr sz="1350" kern="1200">
           <a:solidFill>
             <a:schemeClr val="tx1"/>
           </a:solidFill>
@@ -2924,13 +3083,16 @@
           <a:cs typeface="+mn-cs"/>
         </a:defRPr>
       </a:lvl5pPr>
-      <a:lvl6pPr marL="2514600" indent="-228600" algn="l" defTabSz="914400" rtl="0" eaLnBrk="1" latinLnBrk="0" hangingPunct="1">
+      <a:lvl6pPr marL="1885950" indent="-171450" algn="l" defTabSz="685800" rtl="0" eaLnBrk="1" latinLnBrk="0" hangingPunct="1">
+        <a:lnSpc>
+          <a:spcPct val="90000"/>
+        </a:lnSpc>
         <a:spcBef>
-          <a:spcPct val="20000"/>
+          <a:spcPts val="375"/>
         </a:spcBef>
-        <a:buFont typeface="Arial" pitchFamily="34" charset="0"/>
+        <a:buFont typeface="Arial" panose="020B0604020202020204" pitchFamily="34" charset="0"/>
         <a:buChar char="•"/>
-        <a:defRPr sz="2000" kern="1200">
+        <a:defRPr sz="1350" kern="1200">
           <a:solidFill>
             <a:schemeClr val="tx1"/>
           </a:solidFill>
@@ -2939,13 +3101,16 @@
           <a:cs typeface="+mn-cs"/>
         </a:defRPr>
       </a:lvl6pPr>
-      <a:lvl7pPr marL="2971800" indent="-228600" algn="l" defTabSz="914400" rtl="0" eaLnBrk="1" latinLnBrk="0" hangingPunct="1">
+      <a:lvl7pPr marL="2228850" indent="-171450" algn="l" defTabSz="685800" rtl="0" eaLnBrk="1" latinLnBrk="0" hangingPunct="1">
+        <a:lnSpc>
+          <a:spcPct val="90000"/>
+        </a:lnSpc>
         <a:spcBef>
-          <a:spcPct val="20000"/>
+          <a:spcPts val="375"/>
         </a:spcBef>
-        <a:buFont typeface="Arial" pitchFamily="34" charset="0"/>
+        <a:buFont typeface="Arial" panose="020B0604020202020204" pitchFamily="34" charset="0"/>
         <a:buChar char="•"/>
-        <a:defRPr sz="2000" kern="1200">
+        <a:defRPr sz="1350" kern="1200">
           <a:solidFill>
             <a:schemeClr val="tx1"/>
           </a:solidFill>
@@ -2954,13 +3119,16 @@
           <a:cs typeface="+mn-cs"/>
         </a:defRPr>
       </a:lvl7pPr>
-      <a:lvl8pPr marL="3429000" indent="-228600" algn="l" defTabSz="914400" rtl="0" eaLnBrk="1" latinLnBrk="0" hangingPunct="1">
+      <a:lvl8pPr marL="2571750" indent="-171450" algn="l" defTabSz="685800" rtl="0" eaLnBrk="1" latinLnBrk="0" hangingPunct="1">
+        <a:lnSpc>
+          <a:spcPct val="90000"/>
+        </a:lnSpc>
         <a:spcBef>
-          <a:spcPct val="20000"/>
+          <a:spcPts val="375"/>
         </a:spcBef>
-        <a:buFont typeface="Arial" pitchFamily="34" charset="0"/>
+        <a:buFont typeface="Arial" panose="020B0604020202020204" pitchFamily="34" charset="0"/>
         <a:buChar char="•"/>
-        <a:defRPr sz="2000" kern="1200">
+        <a:defRPr sz="1350" kern="1200">
           <a:solidFill>
             <a:schemeClr val="tx1"/>
           </a:solidFill>
@@ -2969,13 +3137,16 @@
           <a:cs typeface="+mn-cs"/>
         </a:defRPr>
       </a:lvl8pPr>
-      <a:lvl9pPr marL="3886200" indent="-228600" algn="l" defTabSz="914400" rtl="0" eaLnBrk="1" latinLnBrk="0" hangingPunct="1">
+      <a:lvl9pPr marL="2914650" indent="-171450" algn="l" defTabSz="685800" rtl="0" eaLnBrk="1" latinLnBrk="0" hangingPunct="1">
+        <a:lnSpc>
+          <a:spcPct val="90000"/>
+        </a:lnSpc>
         <a:spcBef>
-          <a:spcPct val="20000"/>
+          <a:spcPts val="375"/>
         </a:spcBef>
-        <a:buFont typeface="Arial" pitchFamily="34" charset="0"/>
+        <a:buFont typeface="Arial" panose="020B0604020202020204" pitchFamily="34" charset="0"/>
         <a:buChar char="•"/>
-        <a:defRPr sz="2000" kern="1200">
+        <a:defRPr sz="1350" kern="1200">
           <a:solidFill>
             <a:schemeClr val="tx1"/>
           </a:solidFill>
@@ -2987,10 +3158,10 @@
     </p:bodyStyle>
     <p:otherStyle>
       <a:defPPr>
-        <a:defRPr lang="zh-CN"/>
+        <a:defRPr lang="en-US"/>
       </a:defPPr>
-      <a:lvl1pPr marL="0" algn="l" defTabSz="914400" rtl="0" eaLnBrk="1" latinLnBrk="0" hangingPunct="1">
-        <a:defRPr sz="1800" kern="1200">
+      <a:lvl1pPr marL="0" algn="l" defTabSz="685800" rtl="0" eaLnBrk="1" latinLnBrk="0" hangingPunct="1">
+        <a:defRPr sz="1350" kern="1200">
           <a:solidFill>
             <a:schemeClr val="tx1"/>
           </a:solidFill>
@@ -2999,8 +3170,8 @@
           <a:cs typeface="+mn-cs"/>
         </a:defRPr>
       </a:lvl1pPr>
-      <a:lvl2pPr marL="457200" algn="l" defTabSz="914400" rtl="0" eaLnBrk="1" latinLnBrk="0" hangingPunct="1">
-        <a:defRPr sz="1800" kern="1200">
+      <a:lvl2pPr marL="342900" algn="l" defTabSz="685800" rtl="0" eaLnBrk="1" latinLnBrk="0" hangingPunct="1">
+        <a:defRPr sz="1350" kern="1200">
           <a:solidFill>
             <a:schemeClr val="tx1"/>
           </a:solidFill>
@@ -3009,8 +3180,8 @@
           <a:cs typeface="+mn-cs"/>
         </a:defRPr>
       </a:lvl2pPr>
-      <a:lvl3pPr marL="914400" algn="l" defTabSz="914400" rtl="0" eaLnBrk="1" latinLnBrk="0" hangingPunct="1">
-        <a:defRPr sz="1800" kern="1200">
+      <a:lvl3pPr marL="685800" algn="l" defTabSz="685800" rtl="0" eaLnBrk="1" latinLnBrk="0" hangingPunct="1">
+        <a:defRPr sz="1350" kern="1200">
           <a:solidFill>
             <a:schemeClr val="tx1"/>
           </a:solidFill>
@@ -3019,8 +3190,8 @@
           <a:cs typeface="+mn-cs"/>
         </a:defRPr>
       </a:lvl3pPr>
-      <a:lvl4pPr marL="1371600" algn="l" defTabSz="914400" rtl="0" eaLnBrk="1" latinLnBrk="0" hangingPunct="1">
-        <a:defRPr sz="1800" kern="1200">
+      <a:lvl4pPr marL="1028700" algn="l" defTabSz="685800" rtl="0" eaLnBrk="1" latinLnBrk="0" hangingPunct="1">
+        <a:defRPr sz="1350" kern="1200">
           <a:solidFill>
             <a:schemeClr val="tx1"/>
           </a:solidFill>
@@ -3029,8 +3200,8 @@
           <a:cs typeface="+mn-cs"/>
         </a:defRPr>
       </a:lvl4pPr>
-      <a:lvl5pPr marL="1828800" algn="l" defTabSz="914400" rtl="0" eaLnBrk="1" latinLnBrk="0" hangingPunct="1">
-        <a:defRPr sz="1800" kern="1200">
+      <a:lvl5pPr marL="1371600" algn="l" defTabSz="685800" rtl="0" eaLnBrk="1" latinLnBrk="0" hangingPunct="1">
+        <a:defRPr sz="1350" kern="1200">
           <a:solidFill>
             <a:schemeClr val="tx1"/>
           </a:solidFill>
@@ -3039,8 +3210,8 @@
           <a:cs typeface="+mn-cs"/>
         </a:defRPr>
       </a:lvl5pPr>
-      <a:lvl6pPr marL="2286000" algn="l" defTabSz="914400" rtl="0" eaLnBrk="1" latinLnBrk="0" hangingPunct="1">
-        <a:defRPr sz="1800" kern="1200">
+      <a:lvl6pPr marL="1714500" algn="l" defTabSz="685800" rtl="0" eaLnBrk="1" latinLnBrk="0" hangingPunct="1">
+        <a:defRPr sz="1350" kern="1200">
           <a:solidFill>
             <a:schemeClr val="tx1"/>
           </a:solidFill>
@@ -3049,8 +3220,8 @@
           <a:cs typeface="+mn-cs"/>
         </a:defRPr>
       </a:lvl6pPr>
-      <a:lvl7pPr marL="2743200" algn="l" defTabSz="914400" rtl="0" eaLnBrk="1" latinLnBrk="0" hangingPunct="1">
-        <a:defRPr sz="1800" kern="1200">
+      <a:lvl7pPr marL="2057400" algn="l" defTabSz="685800" rtl="0" eaLnBrk="1" latinLnBrk="0" hangingPunct="1">
+        <a:defRPr sz="1350" kern="1200">
           <a:solidFill>
             <a:schemeClr val="tx1"/>
           </a:solidFill>
@@ -3059,8 +3230,8 @@
           <a:cs typeface="+mn-cs"/>
         </a:defRPr>
       </a:lvl7pPr>
-      <a:lvl8pPr marL="3200400" algn="l" defTabSz="914400" rtl="0" eaLnBrk="1" latinLnBrk="0" hangingPunct="1">
-        <a:defRPr sz="1800" kern="1200">
+      <a:lvl8pPr marL="2400300" algn="l" defTabSz="685800" rtl="0" eaLnBrk="1" latinLnBrk="0" hangingPunct="1">
+        <a:defRPr sz="1350" kern="1200">
           <a:solidFill>
             <a:schemeClr val="tx1"/>
           </a:solidFill>
@@ -3069,8 +3240,8 @@
           <a:cs typeface="+mn-cs"/>
         </a:defRPr>
       </a:lvl8pPr>
-      <a:lvl9pPr marL="3657600" algn="l" defTabSz="914400" rtl="0" eaLnBrk="1" latinLnBrk="0" hangingPunct="1">
-        <a:defRPr sz="1800" kern="1200">
+      <a:lvl9pPr marL="2743200" algn="l" defTabSz="685800" rtl="0" eaLnBrk="1" latinLnBrk="0" hangingPunct="1">
+        <a:defRPr sz="1350" kern="1200">
           <a:solidFill>
             <a:schemeClr val="tx1"/>
           </a:solidFill>
@@ -3081,6 +3252,11 @@
       </a:lvl9pPr>
     </p:otherStyle>
   </p:txStyles>
+  <p:extLst mod="1">
+    <p:ext uri="{27BBF7A9-308A-43DC-89C8-2F10F3537804}">
+      <p15:sldGuideLst xmlns:p15="http://schemas.microsoft.com/office/powerpoint/2012/main" xmlns=""/>
+    </p:ext>
+  </p:extLst>
 </p:sldMaster>
 </file>
 
@@ -3103,12 +3279,31 @@
       </p:grpSpPr>
       <p:sp>
         <p:nvSpPr>
+          <p:cNvPr id="3" name="副标题 2"/>
+          <p:cNvSpPr>
+            <a:spLocks noGrp="1"/>
+          </p:cNvSpPr>
+          <p:nvPr>
+            <p:ph type="subTitle" idx="1"/>
+          </p:nvPr>
+        </p:nvSpPr>
+        <p:spPr/>
+        <p:txBody>
+          <a:bodyPr/>
+          <a:lstStyle/>
+          <a:p>
+            <a:endParaRPr lang="zh-CN" altLang="en-US"/>
+          </a:p>
+        </p:txBody>
+      </p:sp>
+      <p:sp>
+        <p:nvSpPr>
           <p:cNvPr id="2" name="标题 1"/>
           <p:cNvSpPr>
             <a:spLocks noGrp="1"/>
           </p:cNvSpPr>
           <p:nvPr>
-            <p:ph type="ctrTitle"/>
+            <p:ph type="title"/>
           </p:nvPr>
         </p:nvSpPr>
         <p:spPr/>
@@ -3125,25 +3320,6 @@
               <a:t>直方图模块设计</a:t>
             </a:r>
             <a:endParaRPr lang="zh-CN" altLang="en-US" dirty="0"/>
-          </a:p>
-        </p:txBody>
-      </p:sp>
-      <p:sp>
-        <p:nvSpPr>
-          <p:cNvPr id="3" name="副标题 2"/>
-          <p:cNvSpPr>
-            <a:spLocks noGrp="1"/>
-          </p:cNvSpPr>
-          <p:nvPr>
-            <p:ph type="subTitle" idx="1"/>
-          </p:nvPr>
-        </p:nvSpPr>
-        <p:spPr/>
-        <p:txBody>
-          <a:bodyPr/>
-          <a:lstStyle/>
-          <a:p>
-            <a:endParaRPr lang="zh-CN" altLang="en-US"/>
           </a:p>
         </p:txBody>
       </p:sp>
@@ -3151,6 +3327,246 @@
     <p:extLst>
       <p:ext uri="{BB962C8B-B14F-4D97-AF65-F5344CB8AC3E}">
         <p14:creationId xmlns:p14="http://schemas.microsoft.com/office/powerpoint/2010/main" val="2082245797"/>
+      </p:ext>
+    </p:extLst>
+  </p:cSld>
+  <p:clrMapOvr>
+    <a:masterClrMapping/>
+  </p:clrMapOvr>
+  <p:timing>
+    <p:tnLst>
+      <p:par>
+        <p:cTn id="1" dur="indefinite" restart="never" nodeType="tmRoot"/>
+      </p:par>
+    </p:tnLst>
+  </p:timing>
+</p:sld>
+</file>
+
+<file path=ppt/slides/slide10.xml><?xml version="1.0" encoding="utf-8"?>
+<p:sld xmlns:a="http://schemas.openxmlformats.org/drawingml/2006/main" xmlns:r="http://schemas.openxmlformats.org/officeDocument/2006/relationships" xmlns:p="http://schemas.openxmlformats.org/presentationml/2006/main">
+  <p:cSld>
+    <p:spTree>
+      <p:nvGrpSpPr>
+        <p:cNvPr id="1" name=""/>
+        <p:cNvGrpSpPr/>
+        <p:nvPr/>
+      </p:nvGrpSpPr>
+      <p:grpSpPr>
+        <a:xfrm>
+          <a:off x="0" y="0"/>
+          <a:ext cx="0" cy="0"/>
+          <a:chOff x="0" y="0"/>
+          <a:chExt cx="0" cy="0"/>
+        </a:xfrm>
+      </p:grpSpPr>
+      <p:sp>
+        <p:nvSpPr>
+          <p:cNvPr id="2" name="标题 1"/>
+          <p:cNvSpPr>
+            <a:spLocks noGrp="1"/>
+          </p:cNvSpPr>
+          <p:nvPr>
+            <p:ph type="title"/>
+          </p:nvPr>
+        </p:nvSpPr>
+        <p:spPr/>
+        <p:txBody>
+          <a:bodyPr/>
+          <a:lstStyle/>
+          <a:p>
+            <a:r>
+              <a:rPr lang="zh-CN" altLang="en-US" dirty="0" smtClean="0"/>
+              <a:t>系统鲁棒性</a:t>
+            </a:r>
+            <a:endParaRPr lang="zh-CN" altLang="en-US" dirty="0"/>
+          </a:p>
+        </p:txBody>
+      </p:sp>
+      <p:pic>
+        <p:nvPicPr>
+          <p:cNvPr id="4" name="内容占位符 3"/>
+          <p:cNvPicPr>
+            <a:picLocks noGrp="1" noChangeAspect="1"/>
+          </p:cNvPicPr>
+          <p:nvPr>
+            <p:ph idx="1"/>
+          </p:nvPr>
+        </p:nvPicPr>
+        <p:blipFill>
+          <a:blip r:embed="rId2">
+            <a:extLst>
+              <a:ext uri="{28A0092B-C50C-407E-A947-70E740481C1C}">
+                <a14:useLocalDpi xmlns:a14="http://schemas.microsoft.com/office/drawing/2010/main" val="0"/>
+              </a:ext>
+            </a:extLst>
+          </a:blip>
+          <a:stretch>
+            <a:fillRect/>
+          </a:stretch>
+        </p:blipFill>
+        <p:spPr>
+          <a:xfrm>
+            <a:off x="4427984" y="1340768"/>
+            <a:ext cx="4413275" cy="3744416"/>
+          </a:xfrm>
+        </p:spPr>
+      </p:pic>
+      <p:sp>
+        <p:nvSpPr>
+          <p:cNvPr id="5" name="TextBox 4"/>
+          <p:cNvSpPr txBox="1"/>
+          <p:nvPr/>
+        </p:nvSpPr>
+        <p:spPr>
+          <a:xfrm>
+            <a:off x="251520" y="1340768"/>
+            <a:ext cx="3312368" cy="3416320"/>
+          </a:xfrm>
+          <a:prstGeom prst="rect">
+            <a:avLst/>
+          </a:prstGeom>
+          <a:noFill/>
+        </p:spPr>
+        <p:txBody>
+          <a:bodyPr wrap="square" rtlCol="0">
+            <a:spAutoFit/>
+          </a:bodyPr>
+          <a:lstStyle/>
+          <a:p>
+            <a:r>
+              <a:rPr lang="en-US" altLang="zh-CN" dirty="0" err="1" smtClean="0"/>
+              <a:t>HistogramDoctor</a:t>
+            </a:r>
+            <a:r>
+              <a:rPr lang="zh-CN" altLang="en-US" dirty="0" smtClean="0"/>
+              <a:t>：</a:t>
+            </a:r>
+            <a:endParaRPr lang="en-US" altLang="zh-CN" dirty="0" smtClean="0"/>
+          </a:p>
+          <a:p>
+            <a:endParaRPr lang="en-US" altLang="zh-CN" dirty="0"/>
+          </a:p>
+          <a:p>
+            <a:pPr marL="342900" indent="-342900">
+              <a:buAutoNum type="arabicPeriod"/>
+            </a:pPr>
+            <a:r>
+              <a:rPr lang="zh-CN" altLang="en-US" dirty="0" smtClean="0"/>
+              <a:t>监控各节点服务健康情况。</a:t>
+            </a:r>
+            <a:endParaRPr lang="en-US" altLang="zh-CN" dirty="0" smtClean="0"/>
+          </a:p>
+          <a:p>
+            <a:pPr marL="342900" indent="-342900">
+              <a:buAutoNum type="arabicPeriod"/>
+            </a:pPr>
+            <a:endParaRPr lang="en-US" altLang="zh-CN" dirty="0"/>
+          </a:p>
+          <a:p>
+            <a:pPr marL="342900" indent="-342900">
+              <a:buAutoNum type="arabicPeriod"/>
+            </a:pPr>
+            <a:r>
+              <a:rPr lang="zh-CN" altLang="en-US" dirty="0"/>
+              <a:t>提供</a:t>
+            </a:r>
+            <a:r>
+              <a:rPr lang="zh-CN" altLang="en-US" dirty="0" smtClean="0"/>
+              <a:t>接口告知</a:t>
+            </a:r>
+            <a:r>
+              <a:rPr lang="en-US" altLang="zh-CN" dirty="0" err="1" smtClean="0"/>
+              <a:t>HistogramKeeper</a:t>
+            </a:r>
+            <a:r>
+              <a:rPr lang="zh-CN" altLang="en-US" dirty="0" smtClean="0"/>
+              <a:t>某节点健康情况。</a:t>
+            </a:r>
+            <a:endParaRPr lang="en-US" altLang="zh-CN" dirty="0" smtClean="0"/>
+          </a:p>
+          <a:p>
+            <a:pPr marL="342900" indent="-342900">
+              <a:buAutoNum type="arabicPeriod"/>
+            </a:pPr>
+            <a:endParaRPr lang="en-US" altLang="zh-CN" dirty="0"/>
+          </a:p>
+          <a:p>
+            <a:pPr marL="342900" indent="-342900">
+              <a:buAutoNum type="arabicPeriod"/>
+            </a:pPr>
+            <a:r>
+              <a:rPr lang="zh-CN" altLang="en-US" dirty="0" smtClean="0"/>
+              <a:t>当</a:t>
+            </a:r>
+            <a:r>
+              <a:rPr lang="en-US" altLang="zh-CN" dirty="0" err="1" smtClean="0"/>
+              <a:t>HistogramKeeper</a:t>
+            </a:r>
+            <a:r>
+              <a:rPr lang="zh-CN" altLang="en-US" dirty="0" smtClean="0"/>
+              <a:t>服务失效时负责重启或者转移服务。当</a:t>
+            </a:r>
+            <a:r>
+              <a:rPr lang="en-US" altLang="zh-CN" dirty="0" err="1" smtClean="0"/>
+              <a:t>HistogramBuilder</a:t>
+            </a:r>
+            <a:r>
+              <a:rPr lang="zh-CN" altLang="en-US" dirty="0" smtClean="0"/>
+              <a:t>服务失效时尝试重启服务。</a:t>
+            </a:r>
+            <a:endParaRPr lang="en-US" altLang="zh-CN" dirty="0" smtClean="0"/>
+          </a:p>
+        </p:txBody>
+      </p:sp>
+      <p:sp>
+        <p:nvSpPr>
+          <p:cNvPr id="6" name="TextBox 5"/>
+          <p:cNvSpPr txBox="1"/>
+          <p:nvPr/>
+        </p:nvSpPr>
+        <p:spPr>
+          <a:xfrm>
+            <a:off x="251520" y="5013176"/>
+            <a:ext cx="3528392" cy="1200329"/>
+          </a:xfrm>
+          <a:prstGeom prst="rect">
+            <a:avLst/>
+          </a:prstGeom>
+          <a:noFill/>
+        </p:spPr>
+        <p:txBody>
+          <a:bodyPr wrap="square" rtlCol="0">
+            <a:spAutoFit/>
+          </a:bodyPr>
+          <a:lstStyle/>
+          <a:p>
+            <a:r>
+              <a:rPr lang="en-US" altLang="zh-CN" dirty="0" err="1" smtClean="0"/>
+              <a:t>HistogramKeeper</a:t>
+            </a:r>
+            <a:endParaRPr lang="en-US" altLang="zh-CN" dirty="0" smtClean="0"/>
+          </a:p>
+          <a:p>
+            <a:endParaRPr lang="en-US" altLang="zh-CN" dirty="0"/>
+          </a:p>
+          <a:p>
+            <a:r>
+              <a:rPr lang="en-US" altLang="zh-CN" dirty="0" smtClean="0"/>
+              <a:t>1. </a:t>
+            </a:r>
+            <a:r>
+              <a:rPr lang="zh-CN" altLang="en-US" dirty="0" smtClean="0"/>
+              <a:t>在分配任务和提供直方图节点前都首先检查服务健康情况。</a:t>
+            </a:r>
+            <a:endParaRPr lang="zh-CN" altLang="en-US" dirty="0"/>
+          </a:p>
+        </p:txBody>
+      </p:sp>
+    </p:spTree>
+    <p:extLst>
+      <p:ext uri="{BB962C8B-B14F-4D97-AF65-F5344CB8AC3E}">
+        <p14:creationId xmlns:p14="http://schemas.microsoft.com/office/powerpoint/2010/main" val="4093640179"/>
       </p:ext>
     </p:extLst>
   </p:cSld>
@@ -3231,8 +3647,8 @@
         </p:blipFill>
         <p:spPr>
           <a:xfrm>
-            <a:off x="523875" y="2353469"/>
-            <a:ext cx="8096250" cy="3019425"/>
+            <a:off x="516731" y="2188369"/>
+            <a:ext cx="8096250" cy="3324225"/>
           </a:xfrm>
         </p:spPr>
       </p:pic>
@@ -3324,58 +3740,11 @@
         </p:blipFill>
         <p:spPr>
           <a:xfrm>
-            <a:off x="1331640" y="1686223"/>
-            <a:ext cx="6218599" cy="4411116"/>
+            <a:off x="1104089" y="1419225"/>
+            <a:ext cx="6921535" cy="4862513"/>
           </a:xfrm>
         </p:spPr>
       </p:pic>
-      <p:sp>
-        <p:nvSpPr>
-          <p:cNvPr id="5" name="TextBox 4"/>
-          <p:cNvSpPr txBox="1"/>
-          <p:nvPr/>
-        </p:nvSpPr>
-        <p:spPr>
-          <a:xfrm>
-            <a:off x="5364088" y="1516142"/>
-            <a:ext cx="3240360" cy="646331"/>
-          </a:xfrm>
-          <a:prstGeom prst="rect">
-            <a:avLst/>
-          </a:prstGeom>
-        </p:spPr>
-        <p:style>
-          <a:lnRef idx="2">
-            <a:schemeClr val="accent1"/>
-          </a:lnRef>
-          <a:fillRef idx="1">
-            <a:schemeClr val="lt1"/>
-          </a:fillRef>
-          <a:effectRef idx="0">
-            <a:schemeClr val="accent1"/>
-          </a:effectRef>
-          <a:fontRef idx="minor">
-            <a:schemeClr val="dk1"/>
-          </a:fontRef>
-        </p:style>
-        <p:txBody>
-          <a:bodyPr wrap="square" rtlCol="0">
-            <a:spAutoFit/>
-          </a:bodyPr>
-          <a:lstStyle/>
-          <a:p>
-            <a:r>
-              <a:rPr lang="en-US" altLang="zh-CN" dirty="0" smtClean="0"/>
-              <a:t>Q</a:t>
-            </a:r>
-            <a:r>
-              <a:rPr lang="zh-CN" altLang="en-US" dirty="0" smtClean="0"/>
-              <a:t>：如何确定列数据所在数据块。</a:t>
-            </a:r>
-            <a:endParaRPr lang="zh-CN" altLang="en-US" dirty="0"/>
-          </a:p>
-        </p:txBody>
-      </p:sp>
     </p:spTree>
     <p:extLst>
       <p:ext uri="{BB962C8B-B14F-4D97-AF65-F5344CB8AC3E}">
@@ -3389,134 +3758,9 @@
   <p:timing>
     <p:tnLst>
       <p:par>
-        <p:cTn id="1" dur="indefinite" restart="never" nodeType="tmRoot">
-          <p:childTnLst>
-            <p:seq concurrent="1" nextAc="seek">
-              <p:cTn id="2" dur="indefinite" nodeType="mainSeq">
-                <p:childTnLst>
-                  <p:par>
-                    <p:cTn id="3" fill="hold">
-                      <p:stCondLst>
-                        <p:cond delay="indefinite"/>
-                      </p:stCondLst>
-                      <p:childTnLst>
-                        <p:par>
-                          <p:cTn id="4" fill="hold">
-                            <p:stCondLst>
-                              <p:cond delay="0"/>
-                            </p:stCondLst>
-                            <p:childTnLst>
-                              <p:par>
-                                <p:cTn id="5" presetID="53" presetClass="entr" presetSubtype="16" fill="hold" grpId="0" nodeType="clickEffect">
-                                  <p:stCondLst>
-                                    <p:cond delay="0"/>
-                                  </p:stCondLst>
-                                  <p:childTnLst>
-                                    <p:set>
-                                      <p:cBhvr>
-                                        <p:cTn id="6" dur="1" fill="hold">
-                                          <p:stCondLst>
-                                            <p:cond delay="0"/>
-                                          </p:stCondLst>
-                                        </p:cTn>
-                                        <p:tgtEl>
-                                          <p:spTgt spid="5"/>
-                                        </p:tgtEl>
-                                        <p:attrNameLst>
-                                          <p:attrName>style.visibility</p:attrName>
-                                        </p:attrNameLst>
-                                      </p:cBhvr>
-                                      <p:to>
-                                        <p:strVal val="visible"/>
-                                      </p:to>
-                                    </p:set>
-                                    <p:anim calcmode="lin" valueType="num">
-                                      <p:cBhvr>
-                                        <p:cTn id="7" dur="500" fill="hold"/>
-                                        <p:tgtEl>
-                                          <p:spTgt spid="5"/>
-                                        </p:tgtEl>
-                                        <p:attrNameLst>
-                                          <p:attrName>ppt_w</p:attrName>
-                                        </p:attrNameLst>
-                                      </p:cBhvr>
-                                      <p:tavLst>
-                                        <p:tav tm="0">
-                                          <p:val>
-                                            <p:fltVal val="0"/>
-                                          </p:val>
-                                        </p:tav>
-                                        <p:tav tm="100000">
-                                          <p:val>
-                                            <p:strVal val="#ppt_w"/>
-                                          </p:val>
-                                        </p:tav>
-                                      </p:tavLst>
-                                    </p:anim>
-                                    <p:anim calcmode="lin" valueType="num">
-                                      <p:cBhvr>
-                                        <p:cTn id="8" dur="500" fill="hold"/>
-                                        <p:tgtEl>
-                                          <p:spTgt spid="5"/>
-                                        </p:tgtEl>
-                                        <p:attrNameLst>
-                                          <p:attrName>ppt_h</p:attrName>
-                                        </p:attrNameLst>
-                                      </p:cBhvr>
-                                      <p:tavLst>
-                                        <p:tav tm="0">
-                                          <p:val>
-                                            <p:fltVal val="0"/>
-                                          </p:val>
-                                        </p:tav>
-                                        <p:tav tm="100000">
-                                          <p:val>
-                                            <p:strVal val="#ppt_h"/>
-                                          </p:val>
-                                        </p:tav>
-                                      </p:tavLst>
-                                    </p:anim>
-                                    <p:animEffect transition="in" filter="fade">
-                                      <p:cBhvr>
-                                        <p:cTn id="9" dur="500"/>
-                                        <p:tgtEl>
-                                          <p:spTgt spid="5"/>
-                                        </p:tgtEl>
-                                      </p:cBhvr>
-                                    </p:animEffect>
-                                  </p:childTnLst>
-                                </p:cTn>
-                              </p:par>
-                            </p:childTnLst>
-                          </p:cTn>
-                        </p:par>
-                      </p:childTnLst>
-                    </p:cTn>
-                  </p:par>
-                </p:childTnLst>
-              </p:cTn>
-              <p:prevCondLst>
-                <p:cond evt="onPrev" delay="0">
-                  <p:tgtEl>
-                    <p:sldTgt/>
-                  </p:tgtEl>
-                </p:cond>
-              </p:prevCondLst>
-              <p:nextCondLst>
-                <p:cond evt="onNext" delay="0">
-                  <p:tgtEl>
-                    <p:sldTgt/>
-                  </p:tgtEl>
-                </p:cond>
-              </p:nextCondLst>
-            </p:seq>
-          </p:childTnLst>
-        </p:cTn>
+        <p:cTn id="1" dur="indefinite" restart="never" nodeType="tmRoot"/>
       </p:par>
     </p:tnLst>
-    <p:bldLst>
-      <p:bldP spid="5" grpId="0" animBg="1"/>
-    </p:bldLst>
   </p:timing>
 </p:sld>
 </file>
@@ -3567,13 +3811,11 @@
       </p:sp>
       <p:pic>
         <p:nvPicPr>
-          <p:cNvPr id="4" name="内容占位符 3"/>
+          <p:cNvPr id="3" name="图片 2"/>
           <p:cNvPicPr>
-            <a:picLocks noGrp="1" noChangeAspect="1"/>
+            <a:picLocks noChangeAspect="1"/>
           </p:cNvPicPr>
-          <p:nvPr>
-            <p:ph idx="1"/>
-          </p:nvPr>
+          <p:nvPr/>
         </p:nvPicPr>
         <p:blipFill>
           <a:blip r:embed="rId2">
@@ -3589,9 +3831,12 @@
         </p:blipFill>
         <p:spPr>
           <a:xfrm>
-            <a:off x="457200" y="1934793"/>
-            <a:ext cx="8229599" cy="3856776"/>
+            <a:off x="827584" y="1700808"/>
+            <a:ext cx="8105067" cy="4412696"/>
           </a:xfrm>
+          <a:prstGeom prst="rect">
+            <a:avLst/>
+          </a:prstGeom>
         </p:spPr>
       </p:pic>
     </p:spTree>
@@ -3768,7 +4013,7 @@
         </p:blipFill>
         <p:spPr>
           <a:xfrm>
-            <a:off x="523875" y="2262981"/>
+            <a:off x="516731" y="2250281"/>
             <a:ext cx="8096250" cy="3200400"/>
           </a:xfrm>
         </p:spPr>
@@ -3857,7 +4102,7 @@
         </p:blipFill>
         <p:spPr>
           <a:xfrm>
-            <a:off x="523875" y="2305843"/>
+            <a:off x="516731" y="2293144"/>
             <a:ext cx="8096250" cy="3114675"/>
           </a:xfrm>
         </p:spPr>
@@ -3882,120 +4127,396 @@
 </p:sld>
 </file>
 
+<file path=ppt/slides/slide8.xml><?xml version="1.0" encoding="utf-8"?>
+<p:sld xmlns:a="http://schemas.openxmlformats.org/drawingml/2006/main" xmlns:r="http://schemas.openxmlformats.org/officeDocument/2006/relationships" xmlns:p="http://schemas.openxmlformats.org/presentationml/2006/main">
+  <p:cSld>
+    <p:spTree>
+      <p:nvGrpSpPr>
+        <p:cNvPr id="1" name=""/>
+        <p:cNvGrpSpPr/>
+        <p:nvPr/>
+      </p:nvGrpSpPr>
+      <p:grpSpPr>
+        <a:xfrm>
+          <a:off x="0" y="0"/>
+          <a:ext cx="0" cy="0"/>
+          <a:chOff x="0" y="0"/>
+          <a:chExt cx="0" cy="0"/>
+        </a:xfrm>
+      </p:grpSpPr>
+      <p:sp>
+        <p:nvSpPr>
+          <p:cNvPr id="2" name="标题 1"/>
+          <p:cNvSpPr>
+            <a:spLocks noGrp="1"/>
+          </p:cNvSpPr>
+          <p:nvPr>
+            <p:ph type="title"/>
+          </p:nvPr>
+        </p:nvSpPr>
+        <p:spPr/>
+        <p:txBody>
+          <a:bodyPr/>
+          <a:lstStyle/>
+          <a:p>
+            <a:r>
+              <a:rPr lang="en-US" altLang="zh-CN" dirty="0" err="1" smtClean="0"/>
+              <a:t>HistogramKeeper</a:t>
+            </a:r>
+            <a:r>
+              <a:rPr lang="zh-CN" altLang="en-US" dirty="0" smtClean="0"/>
+              <a:t>维护直方图目录</a:t>
+            </a:r>
+            <a:endParaRPr lang="zh-CN" altLang="en-US" dirty="0"/>
+          </a:p>
+        </p:txBody>
+      </p:sp>
+      <p:graphicFrame>
+        <p:nvGraphicFramePr>
+          <p:cNvPr id="5" name="内容占位符 4"/>
+          <p:cNvGraphicFramePr>
+            <a:graphicFrameLocks noGrp="1"/>
+          </p:cNvGraphicFramePr>
+          <p:nvPr>
+            <p:ph idx="1"/>
+            <p:extLst>
+              <p:ext uri="{D42A27DB-BD31-4B8C-83A1-F6EECF244321}">
+                <p14:modId xmlns:p14="http://schemas.microsoft.com/office/powerpoint/2010/main" val="499419796"/>
+              </p:ext>
+            </p:extLst>
+          </p:nvPr>
+        </p:nvGraphicFramePr>
+        <p:xfrm>
+          <a:off x="419100" y="1419225"/>
+          <a:ext cx="8291512" cy="1854200"/>
+        </p:xfrm>
+        <a:graphic>
+          <a:graphicData uri="http://schemas.openxmlformats.org/drawingml/2006/table">
+            <a:tbl>
+              <a:tblPr firstRow="1" bandRow="1">
+                <a:tableStyleId>{5C22544A-7EE6-4342-B048-85BDC9FD1C3A}</a:tableStyleId>
+              </a:tblPr>
+              <a:tblGrid>
+                <a:gridCol w="4145756"/>
+                <a:gridCol w="4145756"/>
+              </a:tblGrid>
+              <a:tr h="370840">
+                <a:tc>
+                  <a:txBody>
+                    <a:bodyPr/>
+                    <a:lstStyle/>
+                    <a:p>
+                      <a:r>
+                        <a:rPr lang="en-US" altLang="zh-CN" dirty="0" smtClean="0"/>
+                        <a:t>Column</a:t>
+                      </a:r>
+                      <a:endParaRPr lang="zh-CN" altLang="en-US" dirty="0"/>
+                    </a:p>
+                  </a:txBody>
+                  <a:tcPr marL="92128" marR="92128"/>
+                </a:tc>
+                <a:tc>
+                  <a:txBody>
+                    <a:bodyPr/>
+                    <a:lstStyle/>
+                    <a:p>
+                      <a:r>
+                        <a:rPr lang="en-US" altLang="zh-CN" dirty="0" smtClean="0"/>
+                        <a:t>Node list</a:t>
+                      </a:r>
+                      <a:endParaRPr lang="zh-CN" altLang="en-US" dirty="0"/>
+                    </a:p>
+                  </a:txBody>
+                  <a:tcPr marL="92128" marR="92128"/>
+                </a:tc>
+              </a:tr>
+              <a:tr h="370840">
+                <a:tc>
+                  <a:txBody>
+                    <a:bodyPr/>
+                    <a:lstStyle/>
+                    <a:p>
+                      <a:r>
+                        <a:rPr lang="en-US" altLang="zh-CN" dirty="0" smtClean="0"/>
+                        <a:t>Column1</a:t>
+                      </a:r>
+                      <a:endParaRPr lang="zh-CN" altLang="en-US" dirty="0"/>
+                    </a:p>
+                  </a:txBody>
+                  <a:tcPr marL="92128" marR="92128"/>
+                </a:tc>
+                <a:tc>
+                  <a:txBody>
+                    <a:bodyPr/>
+                    <a:lstStyle/>
+                    <a:p>
+                      <a:r>
+                        <a:rPr lang="en-US" altLang="zh-CN" dirty="0" smtClean="0"/>
+                        <a:t>Node1 Node3…</a:t>
+                      </a:r>
+                      <a:endParaRPr lang="zh-CN" altLang="en-US" dirty="0"/>
+                    </a:p>
+                  </a:txBody>
+                  <a:tcPr marL="92128" marR="92128"/>
+                </a:tc>
+              </a:tr>
+              <a:tr h="370840">
+                <a:tc>
+                  <a:txBody>
+                    <a:bodyPr/>
+                    <a:lstStyle/>
+                    <a:p>
+                      <a:r>
+                        <a:rPr lang="en-US" altLang="zh-CN" dirty="0" smtClean="0"/>
+                        <a:t>…</a:t>
+                      </a:r>
+                      <a:endParaRPr lang="zh-CN" altLang="en-US" dirty="0"/>
+                    </a:p>
+                  </a:txBody>
+                  <a:tcPr marL="92128" marR="92128"/>
+                </a:tc>
+                <a:tc>
+                  <a:txBody>
+                    <a:bodyPr/>
+                    <a:lstStyle/>
+                    <a:p>
+                      <a:r>
+                        <a:rPr lang="en-US" altLang="zh-CN" dirty="0" smtClean="0"/>
+                        <a:t>…</a:t>
+                      </a:r>
+                      <a:endParaRPr lang="zh-CN" altLang="en-US" dirty="0"/>
+                    </a:p>
+                  </a:txBody>
+                  <a:tcPr marL="92128" marR="92128"/>
+                </a:tc>
+              </a:tr>
+              <a:tr h="370840">
+                <a:tc>
+                  <a:txBody>
+                    <a:bodyPr/>
+                    <a:lstStyle/>
+                    <a:p>
+                      <a:r>
+                        <a:rPr lang="en-US" altLang="zh-CN" dirty="0" smtClean="0"/>
+                        <a:t>…</a:t>
+                      </a:r>
+                      <a:endParaRPr lang="zh-CN" altLang="en-US" dirty="0"/>
+                    </a:p>
+                  </a:txBody>
+                  <a:tcPr marL="92128" marR="92128"/>
+                </a:tc>
+                <a:tc>
+                  <a:txBody>
+                    <a:bodyPr/>
+                    <a:lstStyle/>
+                    <a:p>
+                      <a:r>
+                        <a:rPr lang="en-US" altLang="zh-CN" dirty="0" smtClean="0"/>
+                        <a:t>…</a:t>
+                      </a:r>
+                      <a:endParaRPr lang="zh-CN" altLang="en-US" dirty="0"/>
+                    </a:p>
+                  </a:txBody>
+                  <a:tcPr marL="92128" marR="92128"/>
+                </a:tc>
+              </a:tr>
+              <a:tr h="370840">
+                <a:tc>
+                  <a:txBody>
+                    <a:bodyPr/>
+                    <a:lstStyle/>
+                    <a:p>
+                      <a:r>
+                        <a:rPr lang="en-US" altLang="zh-CN" dirty="0" smtClean="0"/>
+                        <a:t>…</a:t>
+                      </a:r>
+                      <a:endParaRPr lang="zh-CN" altLang="en-US" dirty="0"/>
+                    </a:p>
+                  </a:txBody>
+                  <a:tcPr marL="92128" marR="92128"/>
+                </a:tc>
+                <a:tc>
+                  <a:txBody>
+                    <a:bodyPr/>
+                    <a:lstStyle/>
+                    <a:p>
+                      <a:r>
+                        <a:rPr lang="en-US" altLang="zh-CN" dirty="0" smtClean="0"/>
+                        <a:t>…</a:t>
+                      </a:r>
+                      <a:endParaRPr lang="zh-CN" altLang="en-US" dirty="0"/>
+                    </a:p>
+                  </a:txBody>
+                  <a:tcPr marL="92128" marR="92128"/>
+                </a:tc>
+              </a:tr>
+            </a:tbl>
+          </a:graphicData>
+        </a:graphic>
+      </p:graphicFrame>
+    </p:spTree>
+    <p:extLst>
+      <p:ext uri="{BB962C8B-B14F-4D97-AF65-F5344CB8AC3E}">
+        <p14:creationId xmlns:p14="http://schemas.microsoft.com/office/powerpoint/2010/main" val="536326614"/>
+      </p:ext>
+    </p:extLst>
+  </p:cSld>
+  <p:clrMapOvr>
+    <a:masterClrMapping/>
+  </p:clrMapOvr>
+  <p:timing>
+    <p:tnLst>
+      <p:par>
+        <p:cTn id="1" dur="indefinite" restart="never" nodeType="tmRoot"/>
+      </p:par>
+    </p:tnLst>
+  </p:timing>
+</p:sld>
+</file>
+
+<file path=ppt/slides/slide9.xml><?xml version="1.0" encoding="utf-8"?>
+<p:sld xmlns:a="http://schemas.openxmlformats.org/drawingml/2006/main" xmlns:r="http://schemas.openxmlformats.org/officeDocument/2006/relationships" xmlns:p="http://schemas.openxmlformats.org/presentationml/2006/main">
+  <p:cSld>
+    <p:spTree>
+      <p:nvGrpSpPr>
+        <p:cNvPr id="1" name=""/>
+        <p:cNvGrpSpPr/>
+        <p:nvPr/>
+      </p:nvGrpSpPr>
+      <p:grpSpPr>
+        <a:xfrm>
+          <a:off x="0" y="0"/>
+          <a:ext cx="0" cy="0"/>
+          <a:chOff x="0" y="0"/>
+          <a:chExt cx="0" cy="0"/>
+        </a:xfrm>
+      </p:grpSpPr>
+      <p:sp>
+        <p:nvSpPr>
+          <p:cNvPr id="2" name="标题 1"/>
+          <p:cNvSpPr>
+            <a:spLocks noGrp="1"/>
+          </p:cNvSpPr>
+          <p:nvPr>
+            <p:ph type="title"/>
+          </p:nvPr>
+        </p:nvSpPr>
+        <p:spPr/>
+        <p:txBody>
+          <a:bodyPr/>
+          <a:lstStyle/>
+          <a:p>
+            <a:r>
+              <a:rPr lang="zh-CN" altLang="en-US" dirty="0" smtClean="0"/>
+              <a:t>直方图有效性与一致性</a:t>
+            </a:r>
+            <a:endParaRPr lang="zh-CN" altLang="en-US" dirty="0"/>
+          </a:p>
+        </p:txBody>
+      </p:sp>
+      <p:pic>
+        <p:nvPicPr>
+          <p:cNvPr id="4" name="内容占位符 3"/>
+          <p:cNvPicPr>
+            <a:picLocks noGrp="1" noChangeAspect="1"/>
+          </p:cNvPicPr>
+          <p:nvPr>
+            <p:ph idx="1"/>
+          </p:nvPr>
+        </p:nvPicPr>
+        <p:blipFill>
+          <a:blip r:embed="rId2">
+            <a:extLst>
+              <a:ext uri="{28A0092B-C50C-407E-A947-70E740481C1C}">
+                <a14:useLocalDpi xmlns:a14="http://schemas.microsoft.com/office/drawing/2010/main" val="0"/>
+              </a:ext>
+            </a:extLst>
+          </a:blip>
+          <a:stretch>
+            <a:fillRect/>
+          </a:stretch>
+        </p:blipFill>
+        <p:spPr>
+          <a:xfrm>
+            <a:off x="516731" y="2007394"/>
+            <a:ext cx="8096250" cy="3686175"/>
+          </a:xfrm>
+        </p:spPr>
+      </p:pic>
+    </p:spTree>
+    <p:extLst>
+      <p:ext uri="{BB962C8B-B14F-4D97-AF65-F5344CB8AC3E}">
+        <p14:creationId xmlns:p14="http://schemas.microsoft.com/office/powerpoint/2010/main" val="621497576"/>
+      </p:ext>
+    </p:extLst>
+  </p:cSld>
+  <p:clrMapOvr>
+    <a:masterClrMapping/>
+  </p:clrMapOvr>
+  <p:timing>
+    <p:tnLst>
+      <p:par>
+        <p:cTn id="1" dur="indefinite" restart="never" nodeType="tmRoot"/>
+      </p:par>
+    </p:tnLst>
+  </p:timing>
+</p:sld>
+</file>
+
 <file path=ppt/theme/theme1.xml><?xml version="1.0" encoding="utf-8"?>
-<a:theme xmlns:a="http://schemas.openxmlformats.org/drawingml/2006/main" name="Office 主题​​">
+<a:theme xmlns:a="http://schemas.openxmlformats.org/drawingml/2006/main" name="A000120140530A99PPBG">
   <a:themeElements>
-    <a:clrScheme name="Office">
+    <a:clrScheme name="自定义 449">
       <a:dk1>
-        <a:sysClr val="windowText" lastClr="000000"/>
+        <a:srgbClr val="FFFFFF"/>
       </a:dk1>
       <a:lt1>
-        <a:sysClr val="window" lastClr="FFFFFF"/>
+        <a:srgbClr val="5F5F5F"/>
       </a:lt1>
       <a:dk2>
-        <a:srgbClr val="1F497D"/>
+        <a:srgbClr val="FFFFFF"/>
       </a:dk2>
       <a:lt2>
-        <a:srgbClr val="EEECE1"/>
+        <a:srgbClr val="5F5F5F"/>
       </a:lt2>
       <a:accent1>
-        <a:srgbClr val="4F81BD"/>
+        <a:srgbClr val="78C2C6"/>
       </a:accent1>
       <a:accent2>
-        <a:srgbClr val="C0504D"/>
+        <a:srgbClr val="87AD83"/>
       </a:accent2>
       <a:accent3>
-        <a:srgbClr val="9BBB59"/>
+        <a:srgbClr val="B2B27C"/>
       </a:accent3>
       <a:accent4>
-        <a:srgbClr val="8064A2"/>
+        <a:srgbClr val="C6A3D1"/>
       </a:accent4>
       <a:accent5>
-        <a:srgbClr val="4BACC6"/>
+        <a:srgbClr val="FFC000"/>
       </a:accent5>
       <a:accent6>
-        <a:srgbClr val="F79646"/>
+        <a:srgbClr val="C00000"/>
       </a:accent6>
       <a:hlink>
-        <a:srgbClr val="0000FF"/>
+        <a:srgbClr val="00B0F0"/>
       </a:hlink>
       <a:folHlink>
-        <a:srgbClr val="800080"/>
+        <a:srgbClr val="AFB2B4"/>
       </a:folHlink>
     </a:clrScheme>
-    <a:fontScheme name="Office">
+    <a:fontScheme name="自定义 36">
       <a:majorFont>
-        <a:latin typeface="Calibri"/>
-        <a:ea typeface=""/>
+        <a:latin typeface="Arial"/>
+        <a:ea typeface="华文中宋"/>
         <a:cs typeface=""/>
-        <a:font script="Jpan" typeface="ＭＳ Ｐゴシック"/>
-        <a:font script="Hang" typeface="맑은 고딕"/>
-        <a:font script="Hans" typeface="宋体"/>
-        <a:font script="Hant" typeface="新細明體"/>
-        <a:font script="Arab" typeface="Times New Roman"/>
-        <a:font script="Hebr" typeface="Times New Roman"/>
-        <a:font script="Thai" typeface="Angsana New"/>
-        <a:font script="Ethi" typeface="Nyala"/>
-        <a:font script="Beng" typeface="Vrinda"/>
-        <a:font script="Gujr" typeface="Shruti"/>
-        <a:font script="Khmr" typeface="MoolBoran"/>
-        <a:font script="Knda" typeface="Tunga"/>
-        <a:font script="Guru" typeface="Raavi"/>
-        <a:font script="Cans" typeface="Euphemia"/>
-        <a:font script="Cher" typeface="Plantagenet Cherokee"/>
-        <a:font script="Yiii" typeface="Microsoft Yi Baiti"/>
-        <a:font script="Tibt" typeface="Microsoft Himalaya"/>
-        <a:font script="Thaa" typeface="MV Boli"/>
-        <a:font script="Deva" typeface="Mangal"/>
-        <a:font script="Telu" typeface="Gautami"/>
-        <a:font script="Taml" typeface="Latha"/>
-        <a:font script="Syrc" typeface="Estrangelo Edessa"/>
-        <a:font script="Orya" typeface="Kalinga"/>
-        <a:font script="Mlym" typeface="Kartika"/>
-        <a:font script="Laoo" typeface="DokChampa"/>
-        <a:font script="Sinh" typeface="Iskoola Pota"/>
-        <a:font script="Mong" typeface="Mongolian Baiti"/>
-        <a:font script="Viet" typeface="Times New Roman"/>
-        <a:font script="Uigh" typeface="Microsoft Uighur"/>
-        <a:font script="Geor" typeface="Sylfaen"/>
       </a:majorFont>
       <a:minorFont>
         <a:latin typeface="Calibri"/>
-        <a:ea typeface=""/>
+        <a:ea typeface="幼圆"/>
         <a:cs typeface=""/>
-        <a:font script="Jpan" typeface="ＭＳ Ｐゴシック"/>
-        <a:font script="Hang" typeface="맑은 고딕"/>
-        <a:font script="Hans" typeface="宋体"/>
-        <a:font script="Hant" typeface="新細明體"/>
-        <a:font script="Arab" typeface="Arial"/>
-        <a:font script="Hebr" typeface="Arial"/>
-        <a:font script="Thai" typeface="Cordia New"/>
-        <a:font script="Ethi" typeface="Nyala"/>
-        <a:font script="Beng" typeface="Vrinda"/>
-        <a:font script="Gujr" typeface="Shruti"/>
-        <a:font script="Khmr" typeface="DaunPenh"/>
-        <a:font script="Knda" typeface="Tunga"/>
-        <a:font script="Guru" typeface="Raavi"/>
-        <a:font script="Cans" typeface="Euphemia"/>
-        <a:font script="Cher" typeface="Plantagenet Cherokee"/>
-        <a:font script="Yiii" typeface="Microsoft Yi Baiti"/>
-        <a:font script="Tibt" typeface="Microsoft Himalaya"/>
-        <a:font script="Thaa" typeface="MV Boli"/>
-        <a:font script="Deva" typeface="Mangal"/>
-        <a:font script="Telu" typeface="Gautami"/>
-        <a:font script="Taml" typeface="Latha"/>
-        <a:font script="Syrc" typeface="Estrangelo Edessa"/>
-        <a:font script="Orya" typeface="Kalinga"/>
-        <a:font script="Mlym" typeface="Kartika"/>
-        <a:font script="Laoo" typeface="DokChampa"/>
-        <a:font script="Sinh" typeface="Iskoola Pota"/>
-        <a:font script="Mong" typeface="Mongolian Baiti"/>
-        <a:font script="Viet" typeface="Arial"/>
-        <a:font script="Uigh" typeface="Microsoft Uighur"/>
-        <a:font script="Geor" typeface="Sylfaen"/>
       </a:minorFont>
     </a:fontScheme>
-    <a:fmtScheme name="Office">
+    <a:fmtScheme name="Office 主题">
       <a:fillStyleLst>
         <a:solidFill>
           <a:schemeClr val="phClr"/>
@@ -4004,165 +4525,190 @@
           <a:gsLst>
             <a:gs pos="0">
               <a:schemeClr val="phClr">
-                <a:tint val="50000"/>
-                <a:satMod val="300000"/>
+                <a:lumMod val="110000"/>
+                <a:satMod val="105000"/>
+                <a:tint val="67000"/>
               </a:schemeClr>
             </a:gs>
-            <a:gs pos="35000">
+            <a:gs pos="50000">
               <a:schemeClr val="phClr">
-                <a:tint val="37000"/>
-                <a:satMod val="300000"/>
+                <a:lumMod val="105000"/>
+                <a:satMod val="103000"/>
+                <a:tint val="73000"/>
               </a:schemeClr>
             </a:gs>
             <a:gs pos="100000">
               <a:schemeClr val="phClr">
-                <a:tint val="15000"/>
-                <a:satMod val="350000"/>
+                <a:lumMod val="105000"/>
+                <a:satMod val="109000"/>
+                <a:tint val="81000"/>
               </a:schemeClr>
             </a:gs>
           </a:gsLst>
-          <a:lin ang="16200000" scaled="1"/>
+          <a:lin ang="5400000" scaled="0"/>
         </a:gradFill>
         <a:gradFill rotWithShape="1">
           <a:gsLst>
             <a:gs pos="0">
               <a:schemeClr val="phClr">
-                <a:shade val="51000"/>
-                <a:satMod val="130000"/>
+                <a:satMod val="103000"/>
+                <a:lumMod val="102000"/>
+                <a:tint val="94000"/>
               </a:schemeClr>
             </a:gs>
-            <a:gs pos="80000">
+            <a:gs pos="50000">
               <a:schemeClr val="phClr">
-                <a:shade val="93000"/>
-                <a:satMod val="130000"/>
+                <a:satMod val="110000"/>
+                <a:lumMod val="100000"/>
+                <a:shade val="100000"/>
               </a:schemeClr>
             </a:gs>
             <a:gs pos="100000">
               <a:schemeClr val="phClr">
-                <a:shade val="94000"/>
-                <a:satMod val="135000"/>
+                <a:lumMod val="99000"/>
+                <a:satMod val="120000"/>
+                <a:shade val="78000"/>
               </a:schemeClr>
             </a:gs>
           </a:gsLst>
-          <a:lin ang="16200000" scaled="0"/>
+          <a:lin ang="5400000" scaled="0"/>
         </a:gradFill>
       </a:fillStyleLst>
       <a:lnStyleLst>
-        <a:ln w="9525" cap="flat" cmpd="sng" algn="ctr">
-          <a:solidFill>
-            <a:schemeClr val="phClr">
-              <a:shade val="95000"/>
-              <a:satMod val="105000"/>
-            </a:schemeClr>
-          </a:solidFill>
-          <a:prstDash val="solid"/>
-        </a:ln>
-        <a:ln w="25400" cap="flat" cmpd="sng" algn="ctr">
+        <a:ln w="6350" cap="flat" cmpd="sng" algn="ctr">
           <a:solidFill>
             <a:schemeClr val="phClr"/>
           </a:solidFill>
           <a:prstDash val="solid"/>
+          <a:miter lim="800000"/>
         </a:ln>
-        <a:ln w="38100" cap="flat" cmpd="sng" algn="ctr">
+        <a:ln w="12700" cap="flat" cmpd="sng" algn="ctr">
           <a:solidFill>
             <a:schemeClr val="phClr"/>
           </a:solidFill>
           <a:prstDash val="solid"/>
+          <a:miter lim="800000"/>
+        </a:ln>
+        <a:ln w="19050" cap="flat" cmpd="sng" algn="ctr">
+          <a:solidFill>
+            <a:schemeClr val="phClr"/>
+          </a:solidFill>
+          <a:prstDash val="solid"/>
+          <a:miter lim="800000"/>
         </a:ln>
       </a:lnStyleLst>
       <a:effectStyleLst>
         <a:effectStyle>
+          <a:effectLst/>
+        </a:effectStyle>
+        <a:effectStyle>
+          <a:effectLst/>
+        </a:effectStyle>
+        <a:effectStyle>
           <a:effectLst>
-            <a:outerShdw blurRad="40000" dist="20000" dir="5400000" rotWithShape="0">
+            <a:outerShdw blurRad="57150" dist="19050" dir="5400000" algn="ctr" rotWithShape="0">
               <a:srgbClr val="000000">
-                <a:alpha val="38000"/>
+                <a:alpha val="63000"/>
               </a:srgbClr>
             </a:outerShdw>
           </a:effectLst>
-        </a:effectStyle>
-        <a:effectStyle>
-          <a:effectLst>
-            <a:outerShdw blurRad="40000" dist="23000" dir="5400000" rotWithShape="0">
-              <a:srgbClr val="000000">
-                <a:alpha val="35000"/>
-              </a:srgbClr>
-            </a:outerShdw>
-          </a:effectLst>
-        </a:effectStyle>
-        <a:effectStyle>
-          <a:effectLst>
-            <a:outerShdw blurRad="40000" dist="23000" dir="5400000" rotWithShape="0">
-              <a:srgbClr val="000000">
-                <a:alpha val="35000"/>
-              </a:srgbClr>
-            </a:outerShdw>
-          </a:effectLst>
-          <a:scene3d>
-            <a:camera prst="orthographicFront">
-              <a:rot lat="0" lon="0" rev="0"/>
-            </a:camera>
-            <a:lightRig rig="threePt" dir="t">
-              <a:rot lat="0" lon="0" rev="1200000"/>
-            </a:lightRig>
-          </a:scene3d>
-          <a:sp3d>
-            <a:bevelT w="63500" h="25400"/>
-          </a:sp3d>
         </a:effectStyle>
       </a:effectStyleLst>
       <a:bgFillStyleLst>
         <a:solidFill>
           <a:schemeClr val="phClr"/>
         </a:solidFill>
+        <a:solidFill>
+          <a:schemeClr val="phClr">
+            <a:tint val="95000"/>
+            <a:satMod val="170000"/>
+          </a:schemeClr>
+        </a:solidFill>
         <a:gradFill rotWithShape="1">
           <a:gsLst>
             <a:gs pos="0">
               <a:schemeClr val="phClr">
-                <a:tint val="40000"/>
-                <a:satMod val="350000"/>
+                <a:tint val="93000"/>
+                <a:satMod val="150000"/>
+                <a:shade val="98000"/>
+                <a:lumMod val="102000"/>
               </a:schemeClr>
             </a:gs>
-            <a:gs pos="40000">
+            <a:gs pos="50000">
               <a:schemeClr val="phClr">
-                <a:tint val="45000"/>
-                <a:shade val="99000"/>
-                <a:satMod val="350000"/>
+                <a:tint val="98000"/>
+                <a:satMod val="130000"/>
+                <a:shade val="90000"/>
+                <a:lumMod val="103000"/>
               </a:schemeClr>
             </a:gs>
             <a:gs pos="100000">
               <a:schemeClr val="phClr">
-                <a:shade val="20000"/>
-                <a:satMod val="255000"/>
+                <a:shade val="63000"/>
+                <a:satMod val="120000"/>
               </a:schemeClr>
             </a:gs>
           </a:gsLst>
-          <a:path path="circle">
-            <a:fillToRect l="50000" t="-80000" r="50000" b="180000"/>
-          </a:path>
-        </a:gradFill>
-        <a:gradFill rotWithShape="1">
-          <a:gsLst>
-            <a:gs pos="0">
-              <a:schemeClr val="phClr">
-                <a:tint val="80000"/>
-                <a:satMod val="300000"/>
-              </a:schemeClr>
-            </a:gs>
-            <a:gs pos="100000">
-              <a:schemeClr val="phClr">
-                <a:shade val="30000"/>
-                <a:satMod val="200000"/>
-              </a:schemeClr>
-            </a:gs>
-          </a:gsLst>
-          <a:path path="circle">
-            <a:fillToRect l="50000" t="50000" r="50000" b="50000"/>
-          </a:path>
+          <a:lin ang="5400000" scaled="0"/>
         </a:gradFill>
       </a:bgFillStyleLst>
     </a:fmtScheme>
   </a:themeElements>
-  <a:objectDefaults/>
+  <a:objectDefaults>
+    <a:spDef>
+      <a:spPr>
+        <a:ln>
+          <a:noFill/>
+        </a:ln>
+      </a:spPr>
+      <a:bodyPr rtlCol="0" anchor="ctr"/>
+      <a:lstStyle>
+        <a:defPPr algn="ctr">
+          <a:defRPr/>
+        </a:defPPr>
+      </a:lstStyle>
+      <a:style>
+        <a:lnRef idx="2">
+          <a:schemeClr val="accent1">
+            <a:shade val="50000"/>
+          </a:schemeClr>
+        </a:lnRef>
+        <a:fillRef idx="1">
+          <a:schemeClr val="accent1"/>
+        </a:fillRef>
+        <a:effectRef idx="0">
+          <a:schemeClr val="accent1"/>
+        </a:effectRef>
+        <a:fontRef idx="minor">
+          <a:schemeClr val="lt1"/>
+        </a:fontRef>
+      </a:style>
+    </a:spDef>
+    <a:txDef>
+      <a:spPr>
+        <a:noFill/>
+      </a:spPr>
+      <a:bodyPr wrap="none" rtlCol="0">
+        <a:spAutoFit/>
+      </a:bodyPr>
+      <a:lstStyle>
+        <a:defPPr>
+          <a:lnSpc>
+            <a:spcPct val="130000"/>
+          </a:lnSpc>
+          <a:defRPr sz="1400" dirty="0" smtClean="0">
+            <a:latin typeface="Arial" panose="020B0604020202020204" pitchFamily="34" charset="0"/>
+            <a:ea typeface="微软雅黑" panose="020B0503020204020204" pitchFamily="34" charset="-122"/>
+          </a:defRPr>
+        </a:defPPr>
+      </a:lstStyle>
+    </a:txDef>
+  </a:objectDefaults>
   <a:extraClrSchemeLst/>
+  <a:extLst>
+    <a:ext uri="{05A4C25C-085E-4340-85A3-A5531E510DB2}">
+      <thm15:themeFamily xmlns:thm15="http://schemas.microsoft.com/office/thememl/2012/main" xmlns="" name="Office Theme" id="{62F939B6-93AF-4DB8-9C6B-D6C7DFDC589F}" vid="{4A3C46E8-61CC-4603-A589-7422A47A8E4A}"/>
+    </a:ext>
+  </a:extLst>
 </a:theme>
 </file>
</xml_diff>